<commit_message>
updated ppt and html md generation
</commit_message>
<xml_diff>
--- a/20221222_Building a process-based model, from scratch.pptx
+++ b/20221222_Building a process-based model, from scratch.pptx
@@ -25,8 +25,12 @@
     <p:sldId id="373" r:id="rId22"/>
     <p:sldId id="376" r:id="rId23"/>
     <p:sldId id="377" r:id="rId24"/>
-    <p:sldId id="378" r:id="rId25"/>
-    <p:sldId id="354" r:id="rId26"/>
+    <p:sldId id="387" r:id="rId25"/>
+    <p:sldId id="378" r:id="rId26"/>
+    <p:sldId id="386" r:id="rId27"/>
+    <p:sldId id="383" r:id="rId28"/>
+    <p:sldId id="385" r:id="rId29"/>
+    <p:sldId id="384" r:id="rId30"/>
   </p:sldIdLst>
   <p:sldSz cx="9144000" cy="6858000" type="screen4x3"/>
   <p:notesSz cx="6858000" cy="9144000"/>
@@ -132,8 +136,8 @@
 <pc:chgInfo xmlns:a="http://schemas.openxmlformats.org/drawingml/2006/main" xmlns:r="http://schemas.openxmlformats.org/officeDocument/2006/relationships" xmlns:ac="http://schemas.microsoft.com/office/drawing/2013/main/command" xmlns:pc="http://schemas.microsoft.com/office/powerpoint/2013/main/command">
   <pc:docChgLst>
     <pc:chgData name="Camille Minaudo" userId="d2b11633-1f8f-4312-b16f-0d2396921520" providerId="ADAL" clId="{21CCC727-8F67-46A7-823C-C9D3D1DEC279}"/>
-    <pc:docChg chg="undo custSel addSld delSld modSld">
-      <pc:chgData name="Camille Minaudo" userId="d2b11633-1f8f-4312-b16f-0d2396921520" providerId="ADAL" clId="{21CCC727-8F67-46A7-823C-C9D3D1DEC279}" dt="2022-12-21T17:50:59.089" v="3651" actId="20577"/>
+    <pc:docChg chg="undo custSel addSld delSld modSld sldOrd">
+      <pc:chgData name="Camille Minaudo" userId="d2b11633-1f8f-4312-b16f-0d2396921520" providerId="ADAL" clId="{21CCC727-8F67-46A7-823C-C9D3D1DEC279}" dt="2022-12-21T20:18:26.345" v="4257" actId="207"/>
       <pc:docMkLst>
         <pc:docMk/>
       </pc:docMkLst>
@@ -158,8 +162,8 @@
           <pc:sldMk cId="3336438536" sldId="353"/>
         </pc:sldMkLst>
       </pc:sldChg>
-      <pc:sldChg chg="addSp delSp modSp">
-        <pc:chgData name="Camille Minaudo" userId="d2b11633-1f8f-4312-b16f-0d2396921520" providerId="ADAL" clId="{21CCC727-8F67-46A7-823C-C9D3D1DEC279}" dt="2022-12-21T16:56:45.085" v="1860" actId="478"/>
+      <pc:sldChg chg="addSp delSp modSp del">
+        <pc:chgData name="Camille Minaudo" userId="d2b11633-1f8f-4312-b16f-0d2396921520" providerId="ADAL" clId="{21CCC727-8F67-46A7-823C-C9D3D1DEC279}" dt="2022-12-21T17:54:28.147" v="3692" actId="2696"/>
         <pc:sldMkLst>
           <pc:docMk/>
           <pc:sldMk cId="1212510191" sldId="354"/>
@@ -2636,7 +2640,7 @@
         </pc:cxnChg>
       </pc:sldChg>
       <pc:sldChg chg="addSp delSp modSp add">
-        <pc:chgData name="Camille Minaudo" userId="d2b11633-1f8f-4312-b16f-0d2396921520" providerId="ADAL" clId="{21CCC727-8F67-46A7-823C-C9D3D1DEC279}" dt="2022-12-21T17:25:11.120" v="2627" actId="207"/>
+        <pc:chgData name="Camille Minaudo" userId="d2b11633-1f8f-4312-b16f-0d2396921520" providerId="ADAL" clId="{21CCC727-8F67-46A7-823C-C9D3D1DEC279}" dt="2022-12-21T20:10:39.629" v="4145" actId="20577"/>
         <pc:sldMkLst>
           <pc:docMk/>
           <pc:sldMk cId="2684122622" sldId="373"/>
@@ -2674,11 +2678,35 @@
           </ac:spMkLst>
         </pc:spChg>
         <pc:spChg chg="add mod">
-          <ac:chgData name="Camille Minaudo" userId="d2b11633-1f8f-4312-b16f-0d2396921520" providerId="ADAL" clId="{21CCC727-8F67-46A7-823C-C9D3D1DEC279}" dt="2022-12-21T17:00:36.554" v="2083" actId="114"/>
+          <ac:chgData name="Camille Minaudo" userId="d2b11633-1f8f-4312-b16f-0d2396921520" providerId="ADAL" clId="{21CCC727-8F67-46A7-823C-C9D3D1DEC279}" dt="2022-12-21T20:10:22.974" v="4113" actId="1076"/>
           <ac:spMkLst>
             <pc:docMk/>
             <pc:sldMk cId="2684122622" sldId="373"/>
             <ac:spMk id="6" creationId="{BC2781F2-7D07-433B-828A-F5713DCCFC16}"/>
+          </ac:spMkLst>
+        </pc:spChg>
+        <pc:spChg chg="add del mod">
+          <ac:chgData name="Camille Minaudo" userId="d2b11633-1f8f-4312-b16f-0d2396921520" providerId="ADAL" clId="{21CCC727-8F67-46A7-823C-C9D3D1DEC279}" dt="2022-12-21T20:09:12.157" v="4095" actId="478"/>
+          <ac:spMkLst>
+            <pc:docMk/>
+            <pc:sldMk cId="2684122622" sldId="373"/>
+            <ac:spMk id="7" creationId="{0079F7EA-40B5-4A4D-B202-163E28403B91}"/>
+          </ac:spMkLst>
+        </pc:spChg>
+        <pc:spChg chg="add mod">
+          <ac:chgData name="Camille Minaudo" userId="d2b11633-1f8f-4312-b16f-0d2396921520" providerId="ADAL" clId="{21CCC727-8F67-46A7-823C-C9D3D1DEC279}" dt="2022-12-21T20:10:19.982" v="4112" actId="1076"/>
+          <ac:spMkLst>
+            <pc:docMk/>
+            <pc:sldMk cId="2684122622" sldId="373"/>
+            <ac:spMk id="8" creationId="{D24DE643-A2A2-4610-A49B-9C81B9AA4FA2}"/>
+          </ac:spMkLst>
+        </pc:spChg>
+        <pc:spChg chg="add mod">
+          <ac:chgData name="Camille Minaudo" userId="d2b11633-1f8f-4312-b16f-0d2396921520" providerId="ADAL" clId="{21CCC727-8F67-46A7-823C-C9D3D1DEC279}" dt="2022-12-21T20:10:39.629" v="4145" actId="20577"/>
+          <ac:spMkLst>
+            <pc:docMk/>
+            <pc:sldMk cId="2684122622" sldId="373"/>
+            <ac:spMk id="9" creationId="{7062E9C3-78E1-4578-94B8-BE435248ED6B}"/>
           </ac:spMkLst>
         </pc:spChg>
       </pc:sldChg>
@@ -2841,7 +2869,7 @@
         </pc:cxnChg>
       </pc:sldChg>
       <pc:sldChg chg="addSp delSp modSp add">
-        <pc:chgData name="Camille Minaudo" userId="d2b11633-1f8f-4312-b16f-0d2396921520" providerId="ADAL" clId="{21CCC727-8F67-46A7-823C-C9D3D1DEC279}" dt="2022-12-21T17:40:14.324" v="3300" actId="20577"/>
+        <pc:chgData name="Camille Minaudo" userId="d2b11633-1f8f-4312-b16f-0d2396921520" providerId="ADAL" clId="{21CCC727-8F67-46A7-823C-C9D3D1DEC279}" dt="2022-12-21T20:13:14.578" v="4183" actId="20577"/>
         <pc:sldMkLst>
           <pc:docMk/>
           <pc:sldMk cId="3059699863" sldId="376"/>
@@ -2863,7 +2891,7 @@
           </ac:spMkLst>
         </pc:spChg>
         <pc:spChg chg="mod">
-          <ac:chgData name="Camille Minaudo" userId="d2b11633-1f8f-4312-b16f-0d2396921520" providerId="ADAL" clId="{21CCC727-8F67-46A7-823C-C9D3D1DEC279}" dt="2022-12-21T17:40:14.324" v="3300" actId="20577"/>
+          <ac:chgData name="Camille Minaudo" userId="d2b11633-1f8f-4312-b16f-0d2396921520" providerId="ADAL" clId="{21CCC727-8F67-46A7-823C-C9D3D1DEC279}" dt="2022-12-21T20:13:14.578" v="4183" actId="20577"/>
           <ac:spMkLst>
             <pc:docMk/>
             <pc:sldMk cId="3059699863" sldId="376"/>
@@ -2871,7 +2899,7 @@
           </ac:spMkLst>
         </pc:spChg>
         <pc:spChg chg="mod">
-          <ac:chgData name="Camille Minaudo" userId="d2b11633-1f8f-4312-b16f-0d2396921520" providerId="ADAL" clId="{21CCC727-8F67-46A7-823C-C9D3D1DEC279}" dt="2022-12-21T17:00:06.283" v="2076" actId="20577"/>
+          <ac:chgData name="Camille Minaudo" userId="d2b11633-1f8f-4312-b16f-0d2396921520" providerId="ADAL" clId="{21CCC727-8F67-46A7-823C-C9D3D1DEC279}" dt="2022-12-21T20:10:54.635" v="4147" actId="1076"/>
           <ac:spMkLst>
             <pc:docMk/>
             <pc:sldMk cId="3059699863" sldId="376"/>
@@ -2884,6 +2912,22 @@
             <pc:docMk/>
             <pc:sldMk cId="3059699863" sldId="376"/>
             <ac:spMk id="7" creationId="{1509A78C-A5D2-4A46-A982-14584226B85A}"/>
+          </ac:spMkLst>
+        </pc:spChg>
+        <pc:spChg chg="add mod">
+          <ac:chgData name="Camille Minaudo" userId="d2b11633-1f8f-4312-b16f-0d2396921520" providerId="ADAL" clId="{21CCC727-8F67-46A7-823C-C9D3D1DEC279}" dt="2022-12-21T20:12:53.728" v="4180" actId="20577"/>
+          <ac:spMkLst>
+            <pc:docMk/>
+            <pc:sldMk cId="3059699863" sldId="376"/>
+            <ac:spMk id="8" creationId="{66C07B73-2D52-468E-9828-704C4D5A8410}"/>
+          </ac:spMkLst>
+        </pc:spChg>
+        <pc:spChg chg="add">
+          <ac:chgData name="Camille Minaudo" userId="d2b11633-1f8f-4312-b16f-0d2396921520" providerId="ADAL" clId="{21CCC727-8F67-46A7-823C-C9D3D1DEC279}" dt="2022-12-21T20:10:51.492" v="4146"/>
+          <ac:spMkLst>
+            <pc:docMk/>
+            <pc:sldMk cId="3059699863" sldId="376"/>
+            <ac:spMk id="9" creationId="{AC19ADC8-D339-460F-A617-DAC398341372}"/>
           </ac:spMkLst>
         </pc:spChg>
       </pc:sldChg>
@@ -3039,7 +3083,7 @@
         </pc:graphicFrameChg>
       </pc:sldChg>
       <pc:sldChg chg="addSp delSp modSp add">
-        <pc:chgData name="Camille Minaudo" userId="d2b11633-1f8f-4312-b16f-0d2396921520" providerId="ADAL" clId="{21CCC727-8F67-46A7-823C-C9D3D1DEC279}" dt="2022-12-21T17:38:04.648" v="3165" actId="1076"/>
+        <pc:chgData name="Camille Minaudo" userId="d2b11633-1f8f-4312-b16f-0d2396921520" providerId="ADAL" clId="{21CCC727-8F67-46A7-823C-C9D3D1DEC279}" dt="2022-12-21T20:18:26.345" v="4257" actId="207"/>
         <pc:sldMkLst>
           <pc:docMk/>
           <pc:sldMk cId="3583019850" sldId="378"/>
@@ -3061,7 +3105,7 @@
           </ac:spMkLst>
         </pc:spChg>
         <pc:graphicFrameChg chg="add mod modGraphic">
-          <ac:chgData name="Camille Minaudo" userId="d2b11633-1f8f-4312-b16f-0d2396921520" providerId="ADAL" clId="{21CCC727-8F67-46A7-823C-C9D3D1DEC279}" dt="2022-12-21T17:38:04.648" v="3165" actId="1076"/>
+          <ac:chgData name="Camille Minaudo" userId="d2b11633-1f8f-4312-b16f-0d2396921520" providerId="ADAL" clId="{21CCC727-8F67-46A7-823C-C9D3D1DEC279}" dt="2022-12-21T20:18:26.345" v="4257" actId="207"/>
           <ac:graphicFrameMkLst>
             <pc:docMk/>
             <pc:sldMk cId="3583019850" sldId="378"/>
@@ -3211,7 +3255,7 @@
         </pc:spChg>
       </pc:sldChg>
       <pc:sldChg chg="addSp delSp modSp add">
-        <pc:chgData name="Camille Minaudo" userId="d2b11633-1f8f-4312-b16f-0d2396921520" providerId="ADAL" clId="{21CCC727-8F67-46A7-823C-C9D3D1DEC279}" dt="2022-12-21T17:50:59.089" v="3651" actId="20577"/>
+        <pc:chgData name="Camille Minaudo" userId="d2b11633-1f8f-4312-b16f-0d2396921520" providerId="ADAL" clId="{21CCC727-8F67-46A7-823C-C9D3D1DEC279}" dt="2022-12-21T17:51:08.540" v="3657" actId="20577"/>
         <pc:sldMkLst>
           <pc:docMk/>
           <pc:sldMk cId="3138203796" sldId="382"/>
@@ -3257,7 +3301,7 @@
           </ac:spMkLst>
         </pc:spChg>
         <pc:spChg chg="mod">
-          <ac:chgData name="Camille Minaudo" userId="d2b11633-1f8f-4312-b16f-0d2396921520" providerId="ADAL" clId="{21CCC727-8F67-46A7-823C-C9D3D1DEC279}" dt="2022-12-21T17:50:59.089" v="3651" actId="20577"/>
+          <ac:chgData name="Camille Minaudo" userId="d2b11633-1f8f-4312-b16f-0d2396921520" providerId="ADAL" clId="{21CCC727-8F67-46A7-823C-C9D3D1DEC279}" dt="2022-12-21T17:51:08.540" v="3657" actId="20577"/>
           <ac:spMkLst>
             <pc:docMk/>
             <pc:sldMk cId="3138203796" sldId="382"/>
@@ -3280,6 +3324,329 @@
             <ac:cxnSpMk id="3" creationId="{C96EA3BA-1A01-49A2-B302-57AE92658C12}"/>
           </ac:cxnSpMkLst>
         </pc:cxnChg>
+      </pc:sldChg>
+      <pc:sldChg chg="addSp delSp modSp add">
+        <pc:chgData name="Camille Minaudo" userId="d2b11633-1f8f-4312-b16f-0d2396921520" providerId="ADAL" clId="{21CCC727-8F67-46A7-823C-C9D3D1DEC279}" dt="2022-12-21T17:54:22.993" v="3691" actId="20577"/>
+        <pc:sldMkLst>
+          <pc:docMk/>
+          <pc:sldMk cId="2633124219" sldId="383"/>
+        </pc:sldMkLst>
+        <pc:spChg chg="del">
+          <ac:chgData name="Camille Minaudo" userId="d2b11633-1f8f-4312-b16f-0d2396921520" providerId="ADAL" clId="{21CCC727-8F67-46A7-823C-C9D3D1DEC279}" dt="2022-12-21T17:54:02.358" v="3659"/>
+          <ac:spMkLst>
+            <pc:docMk/>
+            <pc:sldMk cId="2633124219" sldId="383"/>
+            <ac:spMk id="2" creationId="{901B303A-E2D9-4497-BF0A-92A76DE370FA}"/>
+          </ac:spMkLst>
+        </pc:spChg>
+        <pc:spChg chg="del">
+          <ac:chgData name="Camille Minaudo" userId="d2b11633-1f8f-4312-b16f-0d2396921520" providerId="ADAL" clId="{21CCC727-8F67-46A7-823C-C9D3D1DEC279}" dt="2022-12-21T17:54:02.358" v="3659"/>
+          <ac:spMkLst>
+            <pc:docMk/>
+            <pc:sldMk cId="2633124219" sldId="383"/>
+            <ac:spMk id="3" creationId="{A76C4529-6B04-4D07-8BB6-F3A5F8AFCEAA}"/>
+          </ac:spMkLst>
+        </pc:spChg>
+        <pc:spChg chg="add mod">
+          <ac:chgData name="Camille Minaudo" userId="d2b11633-1f8f-4312-b16f-0d2396921520" providerId="ADAL" clId="{21CCC727-8F67-46A7-823C-C9D3D1DEC279}" dt="2022-12-21T17:54:04.940" v="3667" actId="20577"/>
+          <ac:spMkLst>
+            <pc:docMk/>
+            <pc:sldMk cId="2633124219" sldId="383"/>
+            <ac:spMk id="4" creationId="{31DC8417-75A3-4CB5-827F-2AD87699BE16}"/>
+          </ac:spMkLst>
+        </pc:spChg>
+        <pc:spChg chg="add mod">
+          <ac:chgData name="Camille Minaudo" userId="d2b11633-1f8f-4312-b16f-0d2396921520" providerId="ADAL" clId="{21CCC727-8F67-46A7-823C-C9D3D1DEC279}" dt="2022-12-21T17:54:22.993" v="3691" actId="20577"/>
+          <ac:spMkLst>
+            <pc:docMk/>
+            <pc:sldMk cId="2633124219" sldId="383"/>
+            <ac:spMk id="5" creationId="{0CE4BC3D-360D-4D11-BD1D-3573B5F251A0}"/>
+          </ac:spMkLst>
+        </pc:spChg>
+      </pc:sldChg>
+      <pc:sldChg chg="addSp delSp modSp add ord">
+        <pc:chgData name="Camille Minaudo" userId="d2b11633-1f8f-4312-b16f-0d2396921520" providerId="ADAL" clId="{21CCC727-8F67-46A7-823C-C9D3D1DEC279}" dt="2022-12-21T20:04:30.636" v="4091" actId="20577"/>
+        <pc:sldMkLst>
+          <pc:docMk/>
+          <pc:sldMk cId="2866998275" sldId="384"/>
+        </pc:sldMkLst>
+        <pc:spChg chg="del">
+          <ac:chgData name="Camille Minaudo" userId="d2b11633-1f8f-4312-b16f-0d2396921520" providerId="ADAL" clId="{21CCC727-8F67-46A7-823C-C9D3D1DEC279}" dt="2022-12-21T17:54:32.609" v="3694"/>
+          <ac:spMkLst>
+            <pc:docMk/>
+            <pc:sldMk cId="2866998275" sldId="384"/>
+            <ac:spMk id="2" creationId="{05FF6807-8DAC-4805-AC2C-6396EAEA9510}"/>
+          </ac:spMkLst>
+        </pc:spChg>
+        <pc:spChg chg="del">
+          <ac:chgData name="Camille Minaudo" userId="d2b11633-1f8f-4312-b16f-0d2396921520" providerId="ADAL" clId="{21CCC727-8F67-46A7-823C-C9D3D1DEC279}" dt="2022-12-21T17:54:32.609" v="3694"/>
+          <ac:spMkLst>
+            <pc:docMk/>
+            <pc:sldMk cId="2866998275" sldId="384"/>
+            <ac:spMk id="3" creationId="{2CD0C47B-C9A3-465E-80BB-B309C4044446}"/>
+          </ac:spMkLst>
+        </pc:spChg>
+        <pc:spChg chg="add mod">
+          <ac:chgData name="Camille Minaudo" userId="d2b11633-1f8f-4312-b16f-0d2396921520" providerId="ADAL" clId="{21CCC727-8F67-46A7-823C-C9D3D1DEC279}" dt="2022-12-21T20:00:48.815" v="3855" actId="20577"/>
+          <ac:spMkLst>
+            <pc:docMk/>
+            <pc:sldMk cId="2866998275" sldId="384"/>
+            <ac:spMk id="4" creationId="{E09A3DE4-0156-4DE6-8257-989E5FD5576B}"/>
+          </ac:spMkLst>
+        </pc:spChg>
+        <pc:spChg chg="add mod">
+          <ac:chgData name="Camille Minaudo" userId="d2b11633-1f8f-4312-b16f-0d2396921520" providerId="ADAL" clId="{21CCC727-8F67-46A7-823C-C9D3D1DEC279}" dt="2022-12-21T20:04:30.636" v="4091" actId="20577"/>
+          <ac:spMkLst>
+            <pc:docMk/>
+            <pc:sldMk cId="2866998275" sldId="384"/>
+            <ac:spMk id="5" creationId="{048B04A0-3372-4C1A-B3D8-50D71A9C7ABC}"/>
+          </ac:spMkLst>
+        </pc:spChg>
+        <pc:spChg chg="add mod">
+          <ac:chgData name="Camille Minaudo" userId="d2b11633-1f8f-4312-b16f-0d2396921520" providerId="ADAL" clId="{21CCC727-8F67-46A7-823C-C9D3D1DEC279}" dt="2022-12-21T20:03:27.248" v="3989" actId="1035"/>
+          <ac:spMkLst>
+            <pc:docMk/>
+            <pc:sldMk cId="2866998275" sldId="384"/>
+            <ac:spMk id="9" creationId="{957D631F-200D-45C0-8A8E-1DB29731F750}"/>
+          </ac:spMkLst>
+        </pc:spChg>
+        <pc:picChg chg="add del">
+          <ac:chgData name="Camille Minaudo" userId="d2b11633-1f8f-4312-b16f-0d2396921520" providerId="ADAL" clId="{21CCC727-8F67-46A7-823C-C9D3D1DEC279}" dt="2022-12-21T20:01:47.412" v="3912"/>
+          <ac:picMkLst>
+            <pc:docMk/>
+            <pc:sldMk cId="2866998275" sldId="384"/>
+            <ac:picMk id="6" creationId="{2E9BB629-62E4-4FF4-8318-B626A01194A9}"/>
+          </ac:picMkLst>
+        </pc:picChg>
+        <pc:picChg chg="add del">
+          <ac:chgData name="Camille Minaudo" userId="d2b11633-1f8f-4312-b16f-0d2396921520" providerId="ADAL" clId="{21CCC727-8F67-46A7-823C-C9D3D1DEC279}" dt="2022-12-21T20:01:54.926" v="3914" actId="478"/>
+          <ac:picMkLst>
+            <pc:docMk/>
+            <pc:sldMk cId="2866998275" sldId="384"/>
+            <ac:picMk id="7" creationId="{04798D63-8A36-4318-9D24-E87202E5DF96}"/>
+          </ac:picMkLst>
+        </pc:picChg>
+        <pc:picChg chg="add mod">
+          <ac:chgData name="Camille Minaudo" userId="d2b11633-1f8f-4312-b16f-0d2396921520" providerId="ADAL" clId="{21CCC727-8F67-46A7-823C-C9D3D1DEC279}" dt="2022-12-21T20:03:24.061" v="3975" actId="1076"/>
+          <ac:picMkLst>
+            <pc:docMk/>
+            <pc:sldMk cId="2866998275" sldId="384"/>
+            <ac:picMk id="8" creationId="{2FD84676-0C18-4016-8707-3A1B7E2D29C9}"/>
+          </ac:picMkLst>
+        </pc:picChg>
+      </pc:sldChg>
+      <pc:sldChg chg="addSp delSp modSp add">
+        <pc:chgData name="Camille Minaudo" userId="d2b11633-1f8f-4312-b16f-0d2396921520" providerId="ADAL" clId="{21CCC727-8F67-46A7-823C-C9D3D1DEC279}" dt="2022-12-21T20:00:37.680" v="3839" actId="1076"/>
+        <pc:sldMkLst>
+          <pc:docMk/>
+          <pc:sldMk cId="1884481541" sldId="385"/>
+        </pc:sldMkLst>
+        <pc:spChg chg="mod">
+          <ac:chgData name="Camille Minaudo" userId="d2b11633-1f8f-4312-b16f-0d2396921520" providerId="ADAL" clId="{21CCC727-8F67-46A7-823C-C9D3D1DEC279}" dt="2022-12-21T19:56:56.468" v="3777" actId="20577"/>
+          <ac:spMkLst>
+            <pc:docMk/>
+            <pc:sldMk cId="1884481541" sldId="385"/>
+            <ac:spMk id="2" creationId="{2F909956-5898-4C58-8FC3-61225DB40F99}"/>
+          </ac:spMkLst>
+        </pc:spChg>
+        <pc:spChg chg="del">
+          <ac:chgData name="Camille Minaudo" userId="d2b11633-1f8f-4312-b16f-0d2396921520" providerId="ADAL" clId="{21CCC727-8F67-46A7-823C-C9D3D1DEC279}" dt="2022-12-21T19:53:30.024" v="3752" actId="478"/>
+          <ac:spMkLst>
+            <pc:docMk/>
+            <pc:sldMk cId="1884481541" sldId="385"/>
+            <ac:spMk id="3" creationId="{772B750B-1997-4081-A99D-AC1FBE27A17E}"/>
+          </ac:spMkLst>
+        </pc:spChg>
+        <pc:spChg chg="add mod">
+          <ac:chgData name="Camille Minaudo" userId="d2b11633-1f8f-4312-b16f-0d2396921520" providerId="ADAL" clId="{21CCC727-8F67-46A7-823C-C9D3D1DEC279}" dt="2022-12-21T19:59:32.727" v="3816" actId="1076"/>
+          <ac:spMkLst>
+            <pc:docMk/>
+            <pc:sldMk cId="1884481541" sldId="385"/>
+            <ac:spMk id="4" creationId="{AC8B353C-2707-448F-87A3-0DE9964C463A}"/>
+          </ac:spMkLst>
+        </pc:spChg>
+        <pc:spChg chg="add mod">
+          <ac:chgData name="Camille Minaudo" userId="d2b11633-1f8f-4312-b16f-0d2396921520" providerId="ADAL" clId="{21CCC727-8F67-46A7-823C-C9D3D1DEC279}" dt="2022-12-21T19:58:52.980" v="3792" actId="14100"/>
+          <ac:spMkLst>
+            <pc:docMk/>
+            <pc:sldMk cId="1884481541" sldId="385"/>
+            <ac:spMk id="5" creationId="{8517FC58-24FF-4B35-A526-CFAF0CC67C69}"/>
+          </ac:spMkLst>
+        </pc:spChg>
+        <pc:spChg chg="add mod">
+          <ac:chgData name="Camille Minaudo" userId="d2b11633-1f8f-4312-b16f-0d2396921520" providerId="ADAL" clId="{21CCC727-8F67-46A7-823C-C9D3D1DEC279}" dt="2022-12-21T19:59:11.254" v="3813" actId="20577"/>
+          <ac:spMkLst>
+            <pc:docMk/>
+            <pc:sldMk cId="1884481541" sldId="385"/>
+            <ac:spMk id="11" creationId="{27054084-3635-4BAC-8E1E-2F755F43C87B}"/>
+          </ac:spMkLst>
+        </pc:spChg>
+        <pc:spChg chg="add mod">
+          <ac:chgData name="Camille Minaudo" userId="d2b11633-1f8f-4312-b16f-0d2396921520" providerId="ADAL" clId="{21CCC727-8F67-46A7-823C-C9D3D1DEC279}" dt="2022-12-21T20:00:16.766" v="3837" actId="14100"/>
+          <ac:spMkLst>
+            <pc:docMk/>
+            <pc:sldMk cId="1884481541" sldId="385"/>
+            <ac:spMk id="12" creationId="{9440C614-0474-44DB-94ED-FB1C4A19A964}"/>
+          </ac:spMkLst>
+        </pc:spChg>
+        <pc:picChg chg="add mod">
+          <ac:chgData name="Camille Minaudo" userId="d2b11633-1f8f-4312-b16f-0d2396921520" providerId="ADAL" clId="{21CCC727-8F67-46A7-823C-C9D3D1DEC279}" dt="2022-12-21T19:58:34.103" v="3788" actId="1076"/>
+          <ac:picMkLst>
+            <pc:docMk/>
+            <pc:sldMk cId="1884481541" sldId="385"/>
+            <ac:picMk id="2050" creationId="{4B108334-E1D1-414D-8BF3-E75B71927328}"/>
+          </ac:picMkLst>
+        </pc:picChg>
+        <pc:picChg chg="add del mod">
+          <ac:chgData name="Camille Minaudo" userId="d2b11633-1f8f-4312-b16f-0d2396921520" providerId="ADAL" clId="{21CCC727-8F67-46A7-823C-C9D3D1DEC279}" dt="2022-12-21T19:55:24.865" v="3766" actId="478"/>
+          <ac:picMkLst>
+            <pc:docMk/>
+            <pc:sldMk cId="1884481541" sldId="385"/>
+            <ac:picMk id="2052" creationId="{EA96BF87-EEEB-4FEE-BED5-4FAA9DAF9264}"/>
+          </ac:picMkLst>
+        </pc:picChg>
+        <pc:picChg chg="add mod">
+          <ac:chgData name="Camille Minaudo" userId="d2b11633-1f8f-4312-b16f-0d2396921520" providerId="ADAL" clId="{21CCC727-8F67-46A7-823C-C9D3D1DEC279}" dt="2022-12-21T20:00:37.680" v="3839" actId="1076"/>
+          <ac:picMkLst>
+            <pc:docMk/>
+            <pc:sldMk cId="1884481541" sldId="385"/>
+            <ac:picMk id="2054" creationId="{81BBE906-78F1-42F6-BEB7-59AC48FEF2CE}"/>
+          </ac:picMkLst>
+        </pc:picChg>
+        <pc:picChg chg="add mod">
+          <ac:chgData name="Camille Minaudo" userId="d2b11633-1f8f-4312-b16f-0d2396921520" providerId="ADAL" clId="{21CCC727-8F67-46A7-823C-C9D3D1DEC279}" dt="2022-12-21T19:59:53.865" v="3831" actId="1076"/>
+          <ac:picMkLst>
+            <pc:docMk/>
+            <pc:sldMk cId="1884481541" sldId="385"/>
+            <ac:picMk id="2056" creationId="{17D49726-8235-4FD4-BD2C-FF815091C123}"/>
+          </ac:picMkLst>
+        </pc:picChg>
+        <pc:picChg chg="add mod">
+          <ac:chgData name="Camille Minaudo" userId="d2b11633-1f8f-4312-b16f-0d2396921520" providerId="ADAL" clId="{21CCC727-8F67-46A7-823C-C9D3D1DEC279}" dt="2022-12-21T19:59:28.370" v="3815" actId="1076"/>
+          <ac:picMkLst>
+            <pc:docMk/>
+            <pc:sldMk cId="1884481541" sldId="385"/>
+            <ac:picMk id="2058" creationId="{107FC75D-D723-43A3-B7B4-CF76FC541D3F}"/>
+          </ac:picMkLst>
+        </pc:picChg>
+        <pc:cxnChg chg="add mod">
+          <ac:chgData name="Camille Minaudo" userId="d2b11633-1f8f-4312-b16f-0d2396921520" providerId="ADAL" clId="{21CCC727-8F67-46A7-823C-C9D3D1DEC279}" dt="2022-12-21T20:00:37.680" v="3839" actId="1076"/>
+          <ac:cxnSpMkLst>
+            <pc:docMk/>
+            <pc:sldMk cId="1884481541" sldId="385"/>
+            <ac:cxnSpMk id="7" creationId="{608FCC5C-2C64-4379-8192-5920852B4ABF}"/>
+          </ac:cxnSpMkLst>
+        </pc:cxnChg>
+        <pc:cxnChg chg="add mod">
+          <ac:chgData name="Camille Minaudo" userId="d2b11633-1f8f-4312-b16f-0d2396921520" providerId="ADAL" clId="{21CCC727-8F67-46A7-823C-C9D3D1DEC279}" dt="2022-12-21T20:00:37.680" v="3839" actId="1076"/>
+          <ac:cxnSpMkLst>
+            <pc:docMk/>
+            <pc:sldMk cId="1884481541" sldId="385"/>
+            <ac:cxnSpMk id="15" creationId="{4C5A78B4-43E3-4725-B22B-57F51580254F}"/>
+          </ac:cxnSpMkLst>
+        </pc:cxnChg>
+      </pc:sldChg>
+      <pc:sldChg chg="addSp delSp modSp add">
+        <pc:chgData name="Camille Minaudo" userId="d2b11633-1f8f-4312-b16f-0d2396921520" providerId="ADAL" clId="{21CCC727-8F67-46A7-823C-C9D3D1DEC279}" dt="2022-12-21T19:58:40.731" v="3789" actId="1076"/>
+        <pc:sldMkLst>
+          <pc:docMk/>
+          <pc:sldMk cId="2661735550" sldId="386"/>
+        </pc:sldMkLst>
+        <pc:spChg chg="mod">
+          <ac:chgData name="Camille Minaudo" userId="d2b11633-1f8f-4312-b16f-0d2396921520" providerId="ADAL" clId="{21CCC727-8F67-46A7-823C-C9D3D1DEC279}" dt="2022-12-21T18:10:42.289" v="3743" actId="20577"/>
+          <ac:spMkLst>
+            <pc:docMk/>
+            <pc:sldMk cId="2661735550" sldId="386"/>
+            <ac:spMk id="2" creationId="{E5074968-9788-4E0C-93A2-370918581B1E}"/>
+          </ac:spMkLst>
+        </pc:spChg>
+        <pc:spChg chg="del">
+          <ac:chgData name="Camille Minaudo" userId="d2b11633-1f8f-4312-b16f-0d2396921520" providerId="ADAL" clId="{21CCC727-8F67-46A7-823C-C9D3D1DEC279}" dt="2022-12-21T18:10:47.807" v="3744" actId="478"/>
+          <ac:spMkLst>
+            <pc:docMk/>
+            <pc:sldMk cId="2661735550" sldId="386"/>
+            <ac:spMk id="3" creationId="{18CB026E-6341-4F04-8537-A8C1DC48B447}"/>
+          </ac:spMkLst>
+        </pc:spChg>
+        <pc:spChg chg="add mod">
+          <ac:chgData name="Camille Minaudo" userId="d2b11633-1f8f-4312-b16f-0d2396921520" providerId="ADAL" clId="{21CCC727-8F67-46A7-823C-C9D3D1DEC279}" dt="2022-12-21T19:58:40.731" v="3789" actId="1076"/>
+          <ac:spMkLst>
+            <pc:docMk/>
+            <pc:sldMk cId="2661735550" sldId="386"/>
+            <ac:spMk id="4" creationId="{F0B7E2AD-600E-415B-965A-1B067375132F}"/>
+          </ac:spMkLst>
+        </pc:spChg>
+      </pc:sldChg>
+      <pc:sldChg chg="addSp delSp modSp add">
+        <pc:chgData name="Camille Minaudo" userId="d2b11633-1f8f-4312-b16f-0d2396921520" providerId="ADAL" clId="{21CCC727-8F67-46A7-823C-C9D3D1DEC279}" dt="2022-12-21T20:18:07.108" v="4256" actId="20577"/>
+        <pc:sldMkLst>
+          <pc:docMk/>
+          <pc:sldMk cId="2416037306" sldId="387"/>
+        </pc:sldMkLst>
+        <pc:spChg chg="mod">
+          <ac:chgData name="Camille Minaudo" userId="d2b11633-1f8f-4312-b16f-0d2396921520" providerId="ADAL" clId="{21CCC727-8F67-46A7-823C-C9D3D1DEC279}" dt="2022-12-21T20:18:07.108" v="4256" actId="20577"/>
+          <ac:spMkLst>
+            <pc:docMk/>
+            <pc:sldMk cId="2416037306" sldId="387"/>
+            <ac:spMk id="2" creationId="{F2AF36DB-66A0-4AFF-926A-82989EA4A8BB}"/>
+          </ac:spMkLst>
+        </pc:spChg>
+        <pc:spChg chg="mod">
+          <ac:chgData name="Camille Minaudo" userId="d2b11633-1f8f-4312-b16f-0d2396921520" providerId="ADAL" clId="{21CCC727-8F67-46A7-823C-C9D3D1DEC279}" dt="2022-12-21T20:17:43.080" v="4240" actId="1037"/>
+          <ac:spMkLst>
+            <pc:docMk/>
+            <pc:sldMk cId="2416037306" sldId="387"/>
+            <ac:spMk id="9" creationId="{FCA69F59-3AC1-4FCF-96ED-73048B5797E9}"/>
+          </ac:spMkLst>
+        </pc:spChg>
+        <pc:spChg chg="mod">
+          <ac:chgData name="Camille Minaudo" userId="d2b11633-1f8f-4312-b16f-0d2396921520" providerId="ADAL" clId="{21CCC727-8F67-46A7-823C-C9D3D1DEC279}" dt="2022-12-21T20:17:43.080" v="4240" actId="1037"/>
+          <ac:spMkLst>
+            <pc:docMk/>
+            <pc:sldMk cId="2416037306" sldId="387"/>
+            <ac:spMk id="10" creationId="{C52FFF51-9E0C-415D-A5E9-9802CBC76FA8}"/>
+          </ac:spMkLst>
+        </pc:spChg>
+        <pc:spChg chg="mod">
+          <ac:chgData name="Camille Minaudo" userId="d2b11633-1f8f-4312-b16f-0d2396921520" providerId="ADAL" clId="{21CCC727-8F67-46A7-823C-C9D3D1DEC279}" dt="2022-12-21T20:17:43.080" v="4240" actId="1037"/>
+          <ac:spMkLst>
+            <pc:docMk/>
+            <pc:sldMk cId="2416037306" sldId="387"/>
+            <ac:spMk id="11" creationId="{957AC893-96C3-422C-8A8E-BACD1517A20B}"/>
+          </ac:spMkLst>
+        </pc:spChg>
+        <pc:spChg chg="add del mod">
+          <ac:chgData name="Camille Minaudo" userId="d2b11633-1f8f-4312-b16f-0d2396921520" providerId="ADAL" clId="{21CCC727-8F67-46A7-823C-C9D3D1DEC279}" dt="2022-12-21T20:17:48.511" v="4247" actId="1035"/>
+          <ac:spMkLst>
+            <pc:docMk/>
+            <pc:sldMk cId="2416037306" sldId="387"/>
+            <ac:spMk id="12" creationId="{3E3AAEC3-638D-4869-B548-71AFB83DA600}"/>
+          </ac:spMkLst>
+        </pc:spChg>
+        <pc:spChg chg="mod">
+          <ac:chgData name="Camille Minaudo" userId="d2b11633-1f8f-4312-b16f-0d2396921520" providerId="ADAL" clId="{21CCC727-8F67-46A7-823C-C9D3D1DEC279}" dt="2022-12-21T20:17:43.080" v="4240" actId="1037"/>
+          <ac:spMkLst>
+            <pc:docMk/>
+            <pc:sldMk cId="2416037306" sldId="387"/>
+            <ac:spMk id="14" creationId="{E1A72022-D957-4C3B-A952-84720F7C73E2}"/>
+          </ac:spMkLst>
+        </pc:spChg>
+        <pc:spChg chg="mod">
+          <ac:chgData name="Camille Minaudo" userId="d2b11633-1f8f-4312-b16f-0d2396921520" providerId="ADAL" clId="{21CCC727-8F67-46A7-823C-C9D3D1DEC279}" dt="2022-12-21T20:17:43.080" v="4240" actId="1037"/>
+          <ac:spMkLst>
+            <pc:docMk/>
+            <pc:sldMk cId="2416037306" sldId="387"/>
+            <ac:spMk id="15" creationId="{968132AA-E56D-4526-ADBE-03E2C6C9A671}"/>
+          </ac:spMkLst>
+        </pc:spChg>
+        <pc:spChg chg="mod">
+          <ac:chgData name="Camille Minaudo" userId="d2b11633-1f8f-4312-b16f-0d2396921520" providerId="ADAL" clId="{21CCC727-8F67-46A7-823C-C9D3D1DEC279}" dt="2022-12-21T20:17:43.080" v="4240" actId="1037"/>
+          <ac:spMkLst>
+            <pc:docMk/>
+            <pc:sldMk cId="2416037306" sldId="387"/>
+            <ac:spMk id="16" creationId="{9FE4D1E6-528E-40FE-8EBD-8F91AE6D9699}"/>
+          </ac:spMkLst>
+        </pc:spChg>
       </pc:sldChg>
     </pc:docChg>
   </pc:docChgLst>
@@ -7243,7 +7610,7 @@
             <p:spPr>
               <a:xfrm>
                 <a:off x="1140910" y="4918938"/>
-                <a:ext cx="6361100" cy="527580"/>
+                <a:ext cx="6498959" cy="527580"/>
               </a:xfrm>
               <a:prstGeom prst="rect">
                 <a:avLst/>
@@ -7332,7 +7699,7 @@
                         <a:rPr lang="en-GB" b="0" i="1" smtClean="0">
                           <a:latin typeface="Cambria Math" panose="02040503050406030204" pitchFamily="18" charset="0"/>
                         </a:rPr>
-                        <m:t>𝑝𝑟𝑜𝑑𝑢𝑐𝑡𝑖𝑜𝑛</m:t>
+                        <m:t>𝑃𝑟𝑜𝑑𝑢𝑐𝑡𝑖𝑜𝑛</m:t>
                       </m:r>
                       <m:d>
                         <m:dPr>
@@ -7454,7 +7821,7 @@
             <p:spPr>
               <a:xfrm>
                 <a:off x="1140910" y="4918938"/>
-                <a:ext cx="6361100" cy="527580"/>
+                <a:ext cx="6498959" cy="527580"/>
               </a:xfrm>
               <a:prstGeom prst="rect">
                 <a:avLst/>
@@ -21385,7 +21752,7 @@
         </p:nvSpPr>
         <p:spPr>
           <a:xfrm>
-            <a:off x="479302" y="4531084"/>
+            <a:off x="409507" y="3867184"/>
             <a:ext cx="7817410" cy="1200329"/>
           </a:xfrm>
           <a:prstGeom prst="rect">
@@ -21433,6 +21800,132 @@
               <a:rPr lang="en-US" dirty="0"/>
               <a:t>. </a:t>
             </a:r>
+          </a:p>
+        </p:txBody>
+      </p:sp>
+      <p:sp>
+        <p:nvSpPr>
+          <p:cNvPr id="8" name="TextBox 7">
+            <a:extLst>
+              <a:ext uri="{FF2B5EF4-FFF2-40B4-BE49-F238E27FC236}">
+                <a16:creationId xmlns:a16="http://schemas.microsoft.com/office/drawing/2014/main" id="{D24DE643-A2A2-4610-A49B-9C81B9AA4FA2}"/>
+              </a:ext>
+            </a:extLst>
+          </p:cNvPr>
+          <p:cNvSpPr txBox="1"/>
+          <p:nvPr/>
+        </p:nvSpPr>
+        <p:spPr>
+          <a:xfrm>
+            <a:off x="310393" y="5830755"/>
+            <a:ext cx="7905491" cy="307777"/>
+          </a:xfrm>
+          <a:prstGeom prst="rect">
+            <a:avLst/>
+          </a:prstGeom>
+          <a:noFill/>
+        </p:spPr>
+        <p:txBody>
+          <a:bodyPr wrap="square" rtlCol="0">
+            <a:spAutoFit/>
+          </a:bodyPr>
+          <a:lstStyle/>
+          <a:p>
+            <a:r>
+              <a:rPr lang="en-GB" sz="1400" dirty="0" err="1">
+                <a:latin typeface="Consolas" panose="020B0609020204030204" pitchFamily="49" charset="0"/>
+              </a:rPr>
+              <a:t>doPredic</a:t>
+            </a:r>
+            <a:r>
+              <a:rPr lang="en-GB" sz="1400" dirty="0">
+                <a:latin typeface="Consolas" panose="020B0609020204030204" pitchFamily="49" charset="0"/>
+              </a:rPr>
+              <a:t>[i] = </a:t>
+            </a:r>
+            <a:r>
+              <a:rPr lang="en-GB" sz="1400" dirty="0" err="1">
+                <a:latin typeface="Consolas" panose="020B0609020204030204" pitchFamily="49" charset="0"/>
+              </a:rPr>
+              <a:t>doPredic</a:t>
+            </a:r>
+            <a:r>
+              <a:rPr lang="en-GB" sz="1400" dirty="0">
+                <a:latin typeface="Consolas" panose="020B0609020204030204" pitchFamily="49" charset="0"/>
+              </a:rPr>
+              <a:t>[i-1] + </a:t>
+            </a:r>
+            <a:r>
+              <a:rPr lang="en-GB" sz="1400" dirty="0" err="1">
+                <a:latin typeface="Consolas" panose="020B0609020204030204" pitchFamily="49" charset="0"/>
+              </a:rPr>
+              <a:t>npp</a:t>
+            </a:r>
+            <a:r>
+              <a:rPr lang="en-GB" sz="1400" dirty="0">
+                <a:latin typeface="Consolas" panose="020B0609020204030204" pitchFamily="49" charset="0"/>
+              </a:rPr>
+              <a:t>[i]*CtoO2 - </a:t>
+            </a:r>
+            <a:r>
+              <a:rPr lang="en-GB" sz="1400" dirty="0" err="1">
+                <a:latin typeface="Consolas" panose="020B0609020204030204" pitchFamily="49" charset="0"/>
+              </a:rPr>
+              <a:t>Rtot</a:t>
+            </a:r>
+            <a:r>
+              <a:rPr lang="en-GB" sz="1400" dirty="0">
+                <a:latin typeface="Consolas" panose="020B0609020204030204" pitchFamily="49" charset="0"/>
+              </a:rPr>
+              <a:t>[i]*CtoO2 + </a:t>
+            </a:r>
+            <a:r>
+              <a:rPr lang="en-GB" sz="1400" dirty="0" err="1">
+                <a:latin typeface="Consolas" panose="020B0609020204030204" pitchFamily="49" charset="0"/>
+              </a:rPr>
+              <a:t>fatm</a:t>
+            </a:r>
+            <a:r>
+              <a:rPr lang="en-GB" sz="1400" dirty="0">
+                <a:latin typeface="Consolas" panose="020B0609020204030204" pitchFamily="49" charset="0"/>
+              </a:rPr>
+              <a:t>[i] </a:t>
+            </a:r>
+          </a:p>
+        </p:txBody>
+      </p:sp>
+      <p:sp>
+        <p:nvSpPr>
+          <p:cNvPr id="9" name="Rectangle 8">
+            <a:extLst>
+              <a:ext uri="{FF2B5EF4-FFF2-40B4-BE49-F238E27FC236}">
+                <a16:creationId xmlns:a16="http://schemas.microsoft.com/office/drawing/2014/main" id="{7062E9C3-78E1-4578-94B8-BE435248ED6B}"/>
+              </a:ext>
+            </a:extLst>
+          </p:cNvPr>
+          <p:cNvSpPr/>
+          <p:nvPr/>
+        </p:nvSpPr>
+        <p:spPr>
+          <a:xfrm>
+            <a:off x="310393" y="5264468"/>
+            <a:ext cx="1438214" cy="369332"/>
+          </a:xfrm>
+          <a:prstGeom prst="rect">
+            <a:avLst/>
+          </a:prstGeom>
+        </p:spPr>
+        <p:txBody>
+          <a:bodyPr wrap="none">
+            <a:spAutoFit/>
+          </a:bodyPr>
+          <a:lstStyle/>
+          <a:p>
+            <a:r>
+              <a:rPr lang="en-US" dirty="0"/>
+              <a:t>In a R code:</a:t>
+            </a:r>
+            <a:endParaRPr lang="en-GB" dirty="0"/>
           </a:p>
         </p:txBody>
       </p:sp>
@@ -21678,23 +22171,24 @@
                         </a:rPr>
                         <m:t>𝑆𝑒𝑡𝑡𝑙𝑖𝑛𝑔</m:t>
                       </m:r>
-                      <m:d>
-                        <m:dPr>
-                          <m:ctrlPr>
-                            <a:rPr lang="en-GB" i="1">
-                              <a:latin typeface="Cambria Math" panose="02040503050406030204" pitchFamily="18" charset="0"/>
-                            </a:rPr>
-                          </m:ctrlPr>
-                        </m:dPr>
-                        <m:e>
-                          <m:r>
-                            <a:rPr lang="en-GB" i="1">
-                              <a:latin typeface="Cambria Math" panose="02040503050406030204" pitchFamily="18" charset="0"/>
-                            </a:rPr>
-                            <m:t>𝑡</m:t>
-                          </m:r>
-                        </m:e>
-                      </m:d>
+                      <m:r>
+                        <a:rPr lang="en-GB" b="0" i="1" dirty="0" smtClean="0">
+                          <a:latin typeface="Cambria Math" panose="02040503050406030204" pitchFamily="18" charset="0"/>
+                        </a:rPr>
+                        <m:t>(</m:t>
+                      </m:r>
+                      <m:r>
+                        <a:rPr lang="en-GB" b="0" i="1" dirty="0" smtClean="0">
+                          <a:latin typeface="Cambria Math" panose="02040503050406030204" pitchFamily="18" charset="0"/>
+                        </a:rPr>
+                        <m:t>𝑖</m:t>
+                      </m:r>
+                      <m:r>
+                        <a:rPr lang="en-GB" b="0" i="1" dirty="0" smtClean="0">
+                          <a:latin typeface="Cambria Math" panose="02040503050406030204" pitchFamily="18" charset="0"/>
+                        </a:rPr>
+                        <m:t>)</m:t>
+                      </m:r>
                     </m:oMath>
                   </m:oMathPara>
                 </a14:m>
@@ -21762,7 +22256,7 @@
         </p:nvSpPr>
         <p:spPr>
           <a:xfrm>
-            <a:off x="479302" y="4531084"/>
+            <a:off x="409507" y="3895113"/>
             <a:ext cx="7817410" cy="923330"/>
           </a:xfrm>
           <a:prstGeom prst="rect">
@@ -22048,6 +22542,81 @@
           </p:sp>
         </mc:Fallback>
       </mc:AlternateContent>
+      <p:sp>
+        <p:nvSpPr>
+          <p:cNvPr id="8" name="TextBox 7">
+            <a:extLst>
+              <a:ext uri="{FF2B5EF4-FFF2-40B4-BE49-F238E27FC236}">
+                <a16:creationId xmlns:a16="http://schemas.microsoft.com/office/drawing/2014/main" id="{66C07B73-2D52-468E-9828-704C4D5A8410}"/>
+              </a:ext>
+            </a:extLst>
+          </p:cNvPr>
+          <p:cNvSpPr txBox="1"/>
+          <p:nvPr/>
+        </p:nvSpPr>
+        <p:spPr>
+          <a:xfrm>
+            <a:off x="310393" y="5830755"/>
+            <a:ext cx="7905491" cy="307777"/>
+          </a:xfrm>
+          <a:prstGeom prst="rect">
+            <a:avLst/>
+          </a:prstGeom>
+          <a:noFill/>
+        </p:spPr>
+        <p:txBody>
+          <a:bodyPr wrap="square" rtlCol="0">
+            <a:spAutoFit/>
+          </a:bodyPr>
+          <a:lstStyle/>
+          <a:p>
+            <a:r>
+              <a:rPr lang="nb-NO" sz="1400" dirty="0">
+                <a:latin typeface="Consolas" panose="020B0609020204030204" pitchFamily="49" charset="0"/>
+              </a:rPr>
+              <a:t>phyto[i] = phyto[i-1] + npp[i] - Rphyto[i] – Settling[i]</a:t>
+            </a:r>
+            <a:endParaRPr lang="en-GB" sz="1400" dirty="0">
+              <a:latin typeface="Consolas" panose="020B0609020204030204" pitchFamily="49" charset="0"/>
+            </a:endParaRPr>
+          </a:p>
+        </p:txBody>
+      </p:sp>
+      <p:sp>
+        <p:nvSpPr>
+          <p:cNvPr id="9" name="Rectangle 8">
+            <a:extLst>
+              <a:ext uri="{FF2B5EF4-FFF2-40B4-BE49-F238E27FC236}">
+                <a16:creationId xmlns:a16="http://schemas.microsoft.com/office/drawing/2014/main" id="{AC19ADC8-D339-460F-A617-DAC398341372}"/>
+              </a:ext>
+            </a:extLst>
+          </p:cNvPr>
+          <p:cNvSpPr/>
+          <p:nvPr/>
+        </p:nvSpPr>
+        <p:spPr>
+          <a:xfrm>
+            <a:off x="310393" y="5264468"/>
+            <a:ext cx="1438214" cy="369332"/>
+          </a:xfrm>
+          <a:prstGeom prst="rect">
+            <a:avLst/>
+          </a:prstGeom>
+        </p:spPr>
+        <p:txBody>
+          <a:bodyPr wrap="none">
+            <a:spAutoFit/>
+          </a:bodyPr>
+          <a:lstStyle/>
+          <a:p>
+            <a:r>
+              <a:rPr lang="en-US" dirty="0"/>
+              <a:t>In a R code:</a:t>
+            </a:r>
+            <a:endParaRPr lang="en-GB" dirty="0"/>
+          </a:p>
+        </p:txBody>
+      </p:sp>
     </p:spTree>
     <p:extLst>
       <p:ext uri="{BB962C8B-B14F-4D97-AF65-F5344CB8AC3E}">
@@ -24512,6 +25081,566 @@
           <p:cNvPr id="2" name="Title 1">
             <a:extLst>
               <a:ext uri="{FF2B5EF4-FFF2-40B4-BE49-F238E27FC236}">
+                <a16:creationId xmlns:a16="http://schemas.microsoft.com/office/drawing/2014/main" id="{F2AF36DB-66A0-4AFF-926A-82989EA4A8BB}"/>
+              </a:ext>
+            </a:extLst>
+          </p:cNvPr>
+          <p:cNvSpPr>
+            <a:spLocks noGrp="1"/>
+          </p:cNvSpPr>
+          <p:nvPr>
+            <p:ph type="title"/>
+          </p:nvPr>
+        </p:nvSpPr>
+        <p:spPr>
+          <a:xfrm>
+            <a:off x="946404" y="365760"/>
+            <a:ext cx="7269480" cy="422805"/>
+          </a:xfrm>
+        </p:spPr>
+        <p:txBody>
+          <a:bodyPr>
+            <a:noAutofit/>
+          </a:bodyPr>
+          <a:lstStyle/>
+          <a:p>
+            <a:r>
+              <a:rPr lang="en-GB" sz="3200" dirty="0"/>
+              <a:t>These equations (in a R code)</a:t>
+            </a:r>
+          </a:p>
+        </p:txBody>
+      </p:sp>
+      <p:sp>
+        <p:nvSpPr>
+          <p:cNvPr id="9" name="TextBox 8">
+            <a:extLst>
+              <a:ext uri="{FF2B5EF4-FFF2-40B4-BE49-F238E27FC236}">
+                <a16:creationId xmlns:a16="http://schemas.microsoft.com/office/drawing/2014/main" id="{FCA69F59-3AC1-4FCF-96ED-73048B5797E9}"/>
+              </a:ext>
+            </a:extLst>
+          </p:cNvPr>
+          <p:cNvSpPr txBox="1"/>
+          <p:nvPr/>
+        </p:nvSpPr>
+        <p:spPr>
+          <a:xfrm>
+            <a:off x="375583" y="1287466"/>
+            <a:ext cx="6809556" cy="276999"/>
+          </a:xfrm>
+          <a:prstGeom prst="rect">
+            <a:avLst/>
+          </a:prstGeom>
+          <a:noFill/>
+        </p:spPr>
+        <p:txBody>
+          <a:bodyPr wrap="none" lIns="0" tIns="0" rIns="0" bIns="0" rtlCol="0">
+            <a:spAutoFit/>
+          </a:bodyPr>
+          <a:lstStyle/>
+          <a:p>
+            <a:pPr/>
+            <a:r>
+              <a:rPr lang="en-GB" dirty="0" err="1">
+                <a:latin typeface="Consolas" panose="020B0609020204030204" pitchFamily="49" charset="0"/>
+              </a:rPr>
+              <a:t>fatm</a:t>
+            </a:r>
+            <a:r>
+              <a:rPr lang="en-GB" dirty="0">
+                <a:latin typeface="Consolas" panose="020B0609020204030204" pitchFamily="49" charset="0"/>
+              </a:rPr>
+              <a:t>[i] = dt ∗ </a:t>
+            </a:r>
+            <a:r>
+              <a:rPr lang="en-GB" dirty="0" err="1">
+                <a:latin typeface="Consolas" panose="020B0609020204030204" pitchFamily="49" charset="0"/>
+              </a:rPr>
+              <a:t>kDO</a:t>
+            </a:r>
+            <a:r>
+              <a:rPr lang="en-GB" dirty="0">
+                <a:latin typeface="Consolas" panose="020B0609020204030204" pitchFamily="49" charset="0"/>
+              </a:rPr>
+              <a:t> ∗ (</a:t>
+            </a:r>
+            <a:r>
+              <a:rPr lang="en-GB" dirty="0" err="1">
+                <a:latin typeface="Consolas" panose="020B0609020204030204" pitchFamily="49" charset="0"/>
+              </a:rPr>
+              <a:t>dosat</a:t>
+            </a:r>
+            <a:r>
+              <a:rPr lang="en-GB" dirty="0">
+                <a:latin typeface="Consolas" panose="020B0609020204030204" pitchFamily="49" charset="0"/>
+              </a:rPr>
+              <a:t>[i] − </a:t>
+            </a:r>
+            <a:r>
+              <a:rPr lang="en-GB" dirty="0" err="1">
+                <a:latin typeface="Consolas" panose="020B0609020204030204" pitchFamily="49" charset="0"/>
+              </a:rPr>
+              <a:t>doPredic</a:t>
+            </a:r>
+            <a:r>
+              <a:rPr lang="en-GB" dirty="0">
+                <a:latin typeface="Consolas" panose="020B0609020204030204" pitchFamily="49" charset="0"/>
+              </a:rPr>
+              <a:t>[i−1]) / </a:t>
+            </a:r>
+            <a:r>
+              <a:rPr lang="en-GB" dirty="0" err="1">
+                <a:latin typeface="Consolas" panose="020B0609020204030204" pitchFamily="49" charset="0"/>
+              </a:rPr>
+              <a:t>zMix</a:t>
+            </a:r>
+            <a:endParaRPr lang="en-GB" dirty="0">
+              <a:latin typeface="Consolas" panose="020B0609020204030204" pitchFamily="49" charset="0"/>
+            </a:endParaRPr>
+          </a:p>
+        </p:txBody>
+      </p:sp>
+      <p:sp>
+        <p:nvSpPr>
+          <p:cNvPr id="10" name="TextBox 9">
+            <a:extLst>
+              <a:ext uri="{FF2B5EF4-FFF2-40B4-BE49-F238E27FC236}">
+                <a16:creationId xmlns:a16="http://schemas.microsoft.com/office/drawing/2014/main" id="{C52FFF51-9E0C-415D-A5E9-9802CBC76FA8}"/>
+              </a:ext>
+            </a:extLst>
+          </p:cNvPr>
+          <p:cNvSpPr txBox="1"/>
+          <p:nvPr/>
+        </p:nvSpPr>
+        <p:spPr>
+          <a:xfrm>
+            <a:off x="375583" y="1914233"/>
+            <a:ext cx="6965048" cy="553998"/>
+          </a:xfrm>
+          <a:prstGeom prst="rect">
+            <a:avLst/>
+          </a:prstGeom>
+          <a:noFill/>
+        </p:spPr>
+        <p:txBody>
+          <a:bodyPr wrap="none" lIns="0" tIns="0" rIns="0" bIns="0" rtlCol="0">
+            <a:spAutoFit/>
+          </a:bodyPr>
+          <a:lstStyle/>
+          <a:p>
+            <a:pPr/>
+            <a:r>
+              <a:rPr lang="pl-PL" dirty="0">
+                <a:latin typeface="Consolas" panose="020B0609020204030204" pitchFamily="49" charset="0"/>
+              </a:rPr>
+              <a:t>dosat[i] = -0.00006 * wTemp[i]^3 + 0.0069 * wTemp[i]^2 </a:t>
+            </a:r>
+            <a:endParaRPr lang="en-GB" dirty="0">
+              <a:latin typeface="Consolas" panose="020B0609020204030204" pitchFamily="49" charset="0"/>
+            </a:endParaRPr>
+          </a:p>
+          <a:p>
+            <a:pPr/>
+            <a:r>
+              <a:rPr lang="en-GB" dirty="0">
+                <a:latin typeface="Consolas" panose="020B0609020204030204" pitchFamily="49" charset="0"/>
+              </a:rPr>
+              <a:t>		  </a:t>
+            </a:r>
+            <a:r>
+              <a:rPr lang="pl-PL" dirty="0">
+                <a:latin typeface="Consolas" panose="020B0609020204030204" pitchFamily="49" charset="0"/>
+              </a:rPr>
+              <a:t>- 0.3906 * wTemp[i] + 14.578</a:t>
+            </a:r>
+            <a:endParaRPr lang="en-GB" dirty="0">
+              <a:latin typeface="Consolas" panose="020B0609020204030204" pitchFamily="49" charset="0"/>
+            </a:endParaRPr>
+          </a:p>
+        </p:txBody>
+      </p:sp>
+      <p:sp>
+        <p:nvSpPr>
+          <p:cNvPr id="11" name="TextBox 10">
+            <a:extLst>
+              <a:ext uri="{FF2B5EF4-FFF2-40B4-BE49-F238E27FC236}">
+                <a16:creationId xmlns:a16="http://schemas.microsoft.com/office/drawing/2014/main" id="{957AC893-96C3-422C-8A8E-BACD1517A20B}"/>
+              </a:ext>
+            </a:extLst>
+          </p:cNvPr>
+          <p:cNvSpPr txBox="1"/>
+          <p:nvPr/>
+        </p:nvSpPr>
+        <p:spPr>
+          <a:xfrm>
+            <a:off x="375583" y="2785426"/>
+            <a:ext cx="6303008" cy="276999"/>
+          </a:xfrm>
+          <a:prstGeom prst="rect">
+            <a:avLst/>
+          </a:prstGeom>
+          <a:noFill/>
+        </p:spPr>
+        <p:txBody>
+          <a:bodyPr wrap="none" lIns="0" tIns="0" rIns="0" bIns="0" rtlCol="0">
+            <a:spAutoFit/>
+          </a:bodyPr>
+          <a:lstStyle/>
+          <a:p>
+            <a:r>
+              <a:rPr lang="en-GB" dirty="0">
+                <a:latin typeface="Consolas" panose="020B0609020204030204" pitchFamily="49" charset="0"/>
+              </a:rPr>
+              <a:t>Settling[i] = dt ∗ </a:t>
+            </a:r>
+            <a:r>
+              <a:rPr lang="en-GB" dirty="0" err="1">
+                <a:latin typeface="Consolas" panose="020B0609020204030204" pitchFamily="49" charset="0"/>
+              </a:rPr>
+              <a:t>phyto</a:t>
+            </a:r>
+            <a:r>
+              <a:rPr lang="en-GB" dirty="0">
+                <a:latin typeface="Consolas" panose="020B0609020204030204" pitchFamily="49" charset="0"/>
+              </a:rPr>
+              <a:t>[i−1] ∗ </a:t>
+            </a:r>
+            <a:r>
+              <a:rPr lang="en-GB" dirty="0" err="1">
+                <a:latin typeface="Consolas" panose="020B0609020204030204" pitchFamily="49" charset="0"/>
+              </a:rPr>
+              <a:t>settlingPhyto</a:t>
+            </a:r>
+            <a:r>
+              <a:rPr lang="en-GB" dirty="0">
+                <a:latin typeface="Consolas" panose="020B0609020204030204" pitchFamily="49" charset="0"/>
+              </a:rPr>
+              <a:t>/</a:t>
+            </a:r>
+            <a:r>
+              <a:rPr lang="en-GB" dirty="0" err="1">
+                <a:latin typeface="Consolas" panose="020B0609020204030204" pitchFamily="49" charset="0"/>
+              </a:rPr>
+              <a:t>zMix</a:t>
+            </a:r>
+            <a:endParaRPr lang="en-GB" dirty="0">
+              <a:latin typeface="Consolas" panose="020B0609020204030204" pitchFamily="49" charset="0"/>
+            </a:endParaRPr>
+          </a:p>
+        </p:txBody>
+      </p:sp>
+      <p:sp>
+        <p:nvSpPr>
+          <p:cNvPr id="12" name="TextBox 11">
+            <a:extLst>
+              <a:ext uri="{FF2B5EF4-FFF2-40B4-BE49-F238E27FC236}">
+                <a16:creationId xmlns:a16="http://schemas.microsoft.com/office/drawing/2014/main" id="{3E3AAEC3-638D-4869-B548-71AFB83DA600}"/>
+              </a:ext>
+            </a:extLst>
+          </p:cNvPr>
+          <p:cNvSpPr txBox="1"/>
+          <p:nvPr/>
+        </p:nvSpPr>
+        <p:spPr>
+          <a:xfrm>
+            <a:off x="375583" y="3497354"/>
+            <a:ext cx="5318764" cy="553998"/>
+          </a:xfrm>
+          <a:prstGeom prst="rect">
+            <a:avLst/>
+          </a:prstGeom>
+          <a:noFill/>
+        </p:spPr>
+        <p:txBody>
+          <a:bodyPr wrap="none" lIns="0" tIns="0" rIns="0" bIns="0" rtlCol="0">
+            <a:spAutoFit/>
+          </a:bodyPr>
+          <a:lstStyle/>
+          <a:p>
+            <a:pPr/>
+            <a:r>
+              <a:rPr lang="en-GB" dirty="0" err="1">
+                <a:latin typeface="Consolas" panose="020B0609020204030204" pitchFamily="49" charset="0"/>
+              </a:rPr>
+              <a:t>npp</a:t>
+            </a:r>
+            <a:r>
+              <a:rPr lang="en-GB" dirty="0">
+                <a:latin typeface="Consolas" panose="020B0609020204030204" pitchFamily="49" charset="0"/>
+              </a:rPr>
+              <a:t>[i] = dt * PAR[i] * phosphorus * </a:t>
+            </a:r>
+            <a:r>
+              <a:rPr lang="en-GB" dirty="0" err="1">
+                <a:latin typeface="Consolas" panose="020B0609020204030204" pitchFamily="49" charset="0"/>
+              </a:rPr>
+              <a:t>pNPP</a:t>
+            </a:r>
+            <a:r>
+              <a:rPr lang="en-GB" dirty="0">
+                <a:latin typeface="Consolas" panose="020B0609020204030204" pitchFamily="49" charset="0"/>
+              </a:rPr>
+              <a:t> *</a:t>
+            </a:r>
+          </a:p>
+          <a:p>
+            <a:pPr/>
+            <a:r>
+              <a:rPr lang="en-GB" dirty="0">
+                <a:latin typeface="Consolas" panose="020B0609020204030204" pitchFamily="49" charset="0"/>
+              </a:rPr>
+              <a:t>			 </a:t>
+            </a:r>
+            <a:r>
+              <a:rPr lang="en-GB" dirty="0" err="1">
+                <a:latin typeface="Consolas" panose="020B0609020204030204" pitchFamily="49" charset="0"/>
+              </a:rPr>
+              <a:t>thetaNPP</a:t>
+            </a:r>
+            <a:r>
+              <a:rPr lang="en-GB" dirty="0">
+                <a:latin typeface="Consolas" panose="020B0609020204030204" pitchFamily="49" charset="0"/>
+              </a:rPr>
+              <a:t>^(</a:t>
+            </a:r>
+            <a:r>
+              <a:rPr lang="en-GB" dirty="0" err="1">
+                <a:latin typeface="Consolas" panose="020B0609020204030204" pitchFamily="49" charset="0"/>
+              </a:rPr>
+              <a:t>wTemp</a:t>
+            </a:r>
+            <a:r>
+              <a:rPr lang="en-GB" dirty="0">
+                <a:latin typeface="Consolas" panose="020B0609020204030204" pitchFamily="49" charset="0"/>
+              </a:rPr>
+              <a:t>[i] - 20)</a:t>
+            </a:r>
+          </a:p>
+        </p:txBody>
+      </p:sp>
+      <p:sp>
+        <p:nvSpPr>
+          <p:cNvPr id="14" name="TextBox 13">
+            <a:extLst>
+              <a:ext uri="{FF2B5EF4-FFF2-40B4-BE49-F238E27FC236}">
+                <a16:creationId xmlns:a16="http://schemas.microsoft.com/office/drawing/2014/main" id="{E1A72022-D957-4C3B-A952-84720F7C73E2}"/>
+              </a:ext>
+            </a:extLst>
+          </p:cNvPr>
+          <p:cNvSpPr txBox="1"/>
+          <p:nvPr/>
+        </p:nvSpPr>
+        <p:spPr>
+          <a:xfrm>
+            <a:off x="375583" y="4195349"/>
+            <a:ext cx="3165931" cy="276999"/>
+          </a:xfrm>
+          <a:prstGeom prst="rect">
+            <a:avLst/>
+          </a:prstGeom>
+          <a:noFill/>
+        </p:spPr>
+        <p:txBody>
+          <a:bodyPr wrap="none" lIns="0" tIns="0" rIns="0" bIns="0" rtlCol="0">
+            <a:spAutoFit/>
+          </a:bodyPr>
+          <a:lstStyle/>
+          <a:p>
+            <a:r>
+              <a:rPr lang="pl-PL" dirty="0">
+                <a:latin typeface="Consolas" panose="020B0609020204030204" pitchFamily="49" charset="0"/>
+              </a:rPr>
+              <a:t>RDOC[i] = dt * DOC * docR</a:t>
+            </a:r>
+            <a:endParaRPr lang="en-GB" dirty="0">
+              <a:latin typeface="Consolas" panose="020B0609020204030204" pitchFamily="49" charset="0"/>
+            </a:endParaRPr>
+          </a:p>
+        </p:txBody>
+      </p:sp>
+      <p:sp>
+        <p:nvSpPr>
+          <p:cNvPr id="15" name="TextBox 14">
+            <a:extLst>
+              <a:ext uri="{FF2B5EF4-FFF2-40B4-BE49-F238E27FC236}">
+                <a16:creationId xmlns:a16="http://schemas.microsoft.com/office/drawing/2014/main" id="{968132AA-E56D-4526-ADBE-03E2C6C9A671}"/>
+              </a:ext>
+            </a:extLst>
+          </p:cNvPr>
+          <p:cNvSpPr txBox="1"/>
+          <p:nvPr/>
+        </p:nvSpPr>
+        <p:spPr>
+          <a:xfrm>
+            <a:off x="375583" y="4786465"/>
+            <a:ext cx="7724872" cy="276999"/>
+          </a:xfrm>
+          <a:prstGeom prst="rect">
+            <a:avLst/>
+          </a:prstGeom>
+          <a:noFill/>
+        </p:spPr>
+        <p:txBody>
+          <a:bodyPr wrap="none" lIns="0" tIns="0" rIns="0" bIns="0" rtlCol="0">
+            <a:spAutoFit/>
+          </a:bodyPr>
+          <a:lstStyle/>
+          <a:p>
+            <a:pPr/>
+            <a:r>
+              <a:rPr lang="en-GB" dirty="0" err="1">
+                <a:latin typeface="Consolas" panose="020B0609020204030204" pitchFamily="49" charset="0"/>
+              </a:rPr>
+              <a:t>Rphyto</a:t>
+            </a:r>
+            <a:r>
+              <a:rPr lang="en-GB" dirty="0">
+                <a:latin typeface="Consolas" panose="020B0609020204030204" pitchFamily="49" charset="0"/>
+              </a:rPr>
+              <a:t>[i] = dt * </a:t>
+            </a:r>
+            <a:r>
+              <a:rPr lang="en-GB" dirty="0" err="1">
+                <a:latin typeface="Consolas" panose="020B0609020204030204" pitchFamily="49" charset="0"/>
+              </a:rPr>
+              <a:t>phyto</a:t>
+            </a:r>
+            <a:r>
+              <a:rPr lang="en-GB" dirty="0">
+                <a:latin typeface="Consolas" panose="020B0609020204030204" pitchFamily="49" charset="0"/>
+              </a:rPr>
+              <a:t>[i-1] * </a:t>
+            </a:r>
+            <a:r>
+              <a:rPr lang="en-GB" dirty="0" err="1">
+                <a:latin typeface="Consolas" panose="020B0609020204030204" pitchFamily="49" charset="0"/>
+              </a:rPr>
+              <a:t>phytoR</a:t>
+            </a:r>
+            <a:r>
+              <a:rPr lang="en-GB" dirty="0">
+                <a:latin typeface="Consolas" panose="020B0609020204030204" pitchFamily="49" charset="0"/>
+              </a:rPr>
+              <a:t> * </a:t>
+            </a:r>
+            <a:r>
+              <a:rPr lang="en-GB" dirty="0" err="1">
+                <a:latin typeface="Consolas" panose="020B0609020204030204" pitchFamily="49" charset="0"/>
+              </a:rPr>
+              <a:t>thetaR</a:t>
+            </a:r>
+            <a:r>
+              <a:rPr lang="en-GB" dirty="0">
+                <a:latin typeface="Consolas" panose="020B0609020204030204" pitchFamily="49" charset="0"/>
+              </a:rPr>
+              <a:t>^(</a:t>
+            </a:r>
+            <a:r>
+              <a:rPr lang="en-GB" dirty="0" err="1">
+                <a:latin typeface="Consolas" panose="020B0609020204030204" pitchFamily="49" charset="0"/>
+              </a:rPr>
+              <a:t>wTemp</a:t>
+            </a:r>
+            <a:r>
+              <a:rPr lang="en-GB" dirty="0">
+                <a:latin typeface="Consolas" panose="020B0609020204030204" pitchFamily="49" charset="0"/>
+              </a:rPr>
+              <a:t>[i] - 20)</a:t>
+            </a:r>
+          </a:p>
+        </p:txBody>
+      </p:sp>
+      <p:sp>
+        <p:nvSpPr>
+          <p:cNvPr id="16" name="TextBox 15">
+            <a:extLst>
+              <a:ext uri="{FF2B5EF4-FFF2-40B4-BE49-F238E27FC236}">
+                <a16:creationId xmlns:a16="http://schemas.microsoft.com/office/drawing/2014/main" id="{9FE4D1E6-528E-40FE-8EBD-8F91AE6D9699}"/>
+              </a:ext>
+            </a:extLst>
+          </p:cNvPr>
+          <p:cNvSpPr txBox="1"/>
+          <p:nvPr/>
+        </p:nvSpPr>
+        <p:spPr>
+          <a:xfrm>
+            <a:off x="375583" y="5446062"/>
+            <a:ext cx="3672480" cy="276999"/>
+          </a:xfrm>
+          <a:prstGeom prst="rect">
+            <a:avLst/>
+          </a:prstGeom>
+          <a:noFill/>
+        </p:spPr>
+        <p:txBody>
+          <a:bodyPr wrap="none" lIns="0" tIns="0" rIns="0" bIns="0" rtlCol="0">
+            <a:spAutoFit/>
+          </a:bodyPr>
+          <a:lstStyle/>
+          <a:p>
+            <a:pPr/>
+            <a:r>
+              <a:rPr lang="en-GB" dirty="0" err="1">
+                <a:latin typeface="Consolas" panose="020B0609020204030204" pitchFamily="49" charset="0"/>
+              </a:rPr>
+              <a:t>Rtot</a:t>
+            </a:r>
+            <a:r>
+              <a:rPr lang="en-GB" dirty="0">
+                <a:latin typeface="Consolas" panose="020B0609020204030204" pitchFamily="49" charset="0"/>
+              </a:rPr>
+              <a:t>[i] = RDOC[i] + </a:t>
+            </a:r>
+            <a:r>
+              <a:rPr lang="en-GB" dirty="0" err="1">
+                <a:latin typeface="Consolas" panose="020B0609020204030204" pitchFamily="49" charset="0"/>
+              </a:rPr>
+              <a:t>Rphyto</a:t>
+            </a:r>
+            <a:r>
+              <a:rPr lang="en-GB" dirty="0">
+                <a:latin typeface="Consolas" panose="020B0609020204030204" pitchFamily="49" charset="0"/>
+              </a:rPr>
+              <a:t>[i]</a:t>
+            </a:r>
+          </a:p>
+        </p:txBody>
+      </p:sp>
+    </p:spTree>
+    <p:extLst>
+      <p:ext uri="{BB962C8B-B14F-4D97-AF65-F5344CB8AC3E}">
+        <p14:creationId xmlns:p14="http://schemas.microsoft.com/office/powerpoint/2010/main" val="2416037306"/>
+      </p:ext>
+    </p:extLst>
+  </p:cSld>
+  <p:clrMapOvr>
+    <a:masterClrMapping/>
+  </p:clrMapOvr>
+</p:sld>
+</file>
+
+<file path=ppt/slides/slide22.xml><?xml version="1.0" encoding="utf-8"?>
+<p:sld xmlns:a="http://schemas.openxmlformats.org/drawingml/2006/main" xmlns:r="http://schemas.openxmlformats.org/officeDocument/2006/relationships" xmlns:p="http://schemas.openxmlformats.org/presentationml/2006/main">
+  <p:cSld>
+    <p:spTree>
+      <p:nvGrpSpPr>
+        <p:cNvPr id="1" name=""/>
+        <p:cNvGrpSpPr/>
+        <p:nvPr/>
+      </p:nvGrpSpPr>
+      <p:grpSpPr>
+        <a:xfrm>
+          <a:off x="0" y="0"/>
+          <a:ext cx="0" cy="0"/>
+          <a:chOff x="0" y="0"/>
+          <a:chExt cx="0" cy="0"/>
+        </a:xfrm>
+      </p:grpSpPr>
+      <p:sp>
+        <p:nvSpPr>
+          <p:cNvPr id="2" name="Title 1">
+            <a:extLst>
+              <a:ext uri="{FF2B5EF4-FFF2-40B4-BE49-F238E27FC236}">
                 <a16:creationId xmlns:a16="http://schemas.microsoft.com/office/drawing/2014/main" id="{D717483F-63E9-4BE2-BAD7-4508804EE9F2}"/>
               </a:ext>
             </a:extLst>
@@ -24559,7 +25688,7 @@
               <p:nvPr>
                 <p:extLst>
                   <p:ext uri="{D42A27DB-BD31-4B8C-83A1-F6EECF244321}">
-                    <p14:modId xmlns:p14="http://schemas.microsoft.com/office/powerpoint/2010/main" val="448772060"/>
+                    <p14:modId xmlns:p14="http://schemas.microsoft.com/office/powerpoint/2010/main" val="4203786460"/>
                   </p:ext>
                 </p:extLst>
               </p:nvPr>
@@ -24679,6 +25808,9 @@
                                   <m:sSubPr>
                                     <m:ctrlPr>
                                       <a:rPr lang="en-GB" sz="1400" i="1" smtClean="0">
+                                        <a:solidFill>
+                                          <a:schemeClr val="tx1"/>
+                                        </a:solidFill>
                                         <a:latin typeface="Cambria Math" panose="02040503050406030204" pitchFamily="18" charset="0"/>
                                         <a:ea typeface="Cambria Math" panose="02040503050406030204" pitchFamily="18" charset="0"/>
                                       </a:rPr>
@@ -24687,6 +25819,9 @@
                                   <m:e>
                                     <m:r>
                                       <a:rPr lang="en-GB" sz="1400" i="1">
+                                        <a:solidFill>
+                                          <a:schemeClr val="tx1"/>
+                                        </a:solidFill>
                                         <a:latin typeface="Cambria Math" panose="02040503050406030204" pitchFamily="18" charset="0"/>
                                         <a:ea typeface="Cambria Math" panose="02040503050406030204" pitchFamily="18" charset="0"/>
                                       </a:rPr>
@@ -24696,6 +25831,9 @@
                                   <m:sub>
                                     <m:r>
                                       <a:rPr lang="en-GB" sz="1400" i="1">
+                                        <a:solidFill>
+                                          <a:schemeClr val="tx1"/>
+                                        </a:solidFill>
                                         <a:latin typeface="Cambria Math" panose="02040503050406030204" pitchFamily="18" charset="0"/>
                                         <a:ea typeface="Cambria Math" panose="02040503050406030204" pitchFamily="18" charset="0"/>
                                       </a:rPr>
@@ -24703,6 +25841,9 @@
                                     </m:r>
                                     <m:r>
                                       <a:rPr lang="en-GB" sz="1400" i="1">
+                                        <a:solidFill>
+                                          <a:schemeClr val="tx1"/>
+                                        </a:solidFill>
                                         <a:latin typeface="Cambria Math" panose="02040503050406030204" pitchFamily="18" charset="0"/>
                                         <a:ea typeface="Cambria Math" panose="02040503050406030204" pitchFamily="18" charset="0"/>
                                       </a:rPr>
@@ -24710,6 +25851,9 @@
                                     </m:r>
                                     <m:r>
                                       <a:rPr lang="en-GB" sz="1400" i="1">
+                                        <a:solidFill>
+                                          <a:schemeClr val="tx1"/>
+                                        </a:solidFill>
                                         <a:latin typeface="Cambria Math" panose="02040503050406030204" pitchFamily="18" charset="0"/>
                                         <a:ea typeface="Cambria Math" panose="02040503050406030204" pitchFamily="18" charset="0"/>
                                       </a:rPr>
@@ -24717,6 +25861,9 @@
                                     </m:r>
                                     <m:r>
                                       <a:rPr lang="en-GB" sz="1400" i="1">
+                                        <a:solidFill>
+                                          <a:schemeClr val="tx1"/>
+                                        </a:solidFill>
                                         <a:latin typeface="Cambria Math" panose="02040503050406030204" pitchFamily="18" charset="0"/>
                                         <a:ea typeface="Cambria Math" panose="02040503050406030204" pitchFamily="18" charset="0"/>
                                       </a:rPr>
@@ -24727,7 +25874,11 @@
                               </m:oMath>
                             </m:oMathPara>
                           </a14:m>
-                          <a:endParaRPr lang="en-GB" sz="1400" dirty="0"/>
+                          <a:endParaRPr lang="en-GB" sz="1400" dirty="0">
+                            <a:solidFill>
+                              <a:schemeClr val="tx1"/>
+                            </a:solidFill>
+                          </a:endParaRPr>
                         </a:p>
                       </a:txBody>
                       <a:tcPr/>
@@ -24798,7 +25949,7 @@
                                     <m:ctrlPr>
                                       <a:rPr lang="en-GB" sz="1400" i="1" smtClean="0">
                                         <a:solidFill>
-                                          <a:srgbClr val="FF0000"/>
+                                          <a:schemeClr val="tx1"/>
                                         </a:solidFill>
                                         <a:latin typeface="Cambria Math" panose="02040503050406030204" pitchFamily="18" charset="0"/>
                                         <a:ea typeface="Cambria Math" panose="02040503050406030204" pitchFamily="18" charset="0"/>
@@ -24809,7 +25960,7 @@
                                     <m:r>
                                       <a:rPr lang="en-GB" sz="1400" i="1">
                                         <a:solidFill>
-                                          <a:srgbClr val="FF0000"/>
+                                          <a:schemeClr val="tx1"/>
                                         </a:solidFill>
                                         <a:latin typeface="Cambria Math" panose="02040503050406030204" pitchFamily="18" charset="0"/>
                                         <a:ea typeface="Cambria Math" panose="02040503050406030204" pitchFamily="18" charset="0"/>
@@ -24821,7 +25972,7 @@
                                     <m:r>
                                       <a:rPr lang="en-GB" sz="1400" i="1">
                                         <a:solidFill>
-                                          <a:srgbClr val="FF0000"/>
+                                          <a:schemeClr val="tx1"/>
                                         </a:solidFill>
                                         <a:latin typeface="Cambria Math" panose="02040503050406030204" pitchFamily="18" charset="0"/>
                                         <a:ea typeface="Cambria Math" panose="02040503050406030204" pitchFamily="18" charset="0"/>
@@ -24833,7 +25984,11 @@
                               </m:oMath>
                             </m:oMathPara>
                           </a14:m>
-                          <a:endParaRPr lang="en-GB" sz="1400" dirty="0"/>
+                          <a:endParaRPr lang="en-GB" sz="1400" dirty="0">
+                            <a:solidFill>
+                              <a:schemeClr val="tx1"/>
+                            </a:solidFill>
+                          </a:endParaRPr>
                         </a:p>
                       </a:txBody>
                       <a:tcPr/>
@@ -24900,7 +26055,7 @@
                                     <m:ctrlPr>
                                       <a:rPr lang="en-GB" sz="1400" b="0" i="1" smtClean="0">
                                         <a:solidFill>
-                                          <a:srgbClr val="FF0000"/>
+                                          <a:schemeClr val="tx1"/>
                                         </a:solidFill>
                                         <a:latin typeface="Cambria Math" panose="02040503050406030204" pitchFamily="18" charset="0"/>
                                         <a:ea typeface="Cambria Math" panose="02040503050406030204" pitchFamily="18" charset="0"/>
@@ -24911,7 +26066,7 @@
                                     <m:r>
                                       <a:rPr lang="en-GB" sz="1400" b="0" i="1" smtClean="0">
                                         <a:solidFill>
-                                          <a:srgbClr val="FF0000"/>
+                                          <a:schemeClr val="tx1"/>
                                         </a:solidFill>
                                         <a:latin typeface="Cambria Math" panose="02040503050406030204" pitchFamily="18" charset="0"/>
                                         <a:ea typeface="Cambria Math" panose="02040503050406030204" pitchFamily="18" charset="0"/>
@@ -24923,7 +26078,7 @@
                                     <m:r>
                                       <a:rPr lang="en-GB" sz="1400" b="0" i="1" smtClean="0">
                                         <a:solidFill>
-                                          <a:srgbClr val="FF0000"/>
+                                          <a:schemeClr val="tx1"/>
                                         </a:solidFill>
                                         <a:latin typeface="Cambria Math" panose="02040503050406030204" pitchFamily="18" charset="0"/>
                                         <a:ea typeface="Cambria Math" panose="02040503050406030204" pitchFamily="18" charset="0"/>
@@ -24935,7 +26090,11 @@
                               </m:oMath>
                             </m:oMathPara>
                           </a14:m>
-                          <a:endParaRPr lang="en-GB" sz="1400" dirty="0"/>
+                          <a:endParaRPr lang="en-GB" sz="1400" dirty="0">
+                            <a:solidFill>
+                              <a:schemeClr val="tx1"/>
+                            </a:solidFill>
+                          </a:endParaRPr>
                         </a:p>
                       </a:txBody>
                       <a:tcPr/>
@@ -25002,7 +26161,7 @@
                                     <m:ctrlPr>
                                       <a:rPr lang="en-GB" sz="1400" b="0" i="1" smtClean="0">
                                         <a:solidFill>
-                                          <a:srgbClr val="FF0000"/>
+                                          <a:schemeClr val="tx1"/>
                                         </a:solidFill>
                                         <a:latin typeface="Cambria Math" panose="02040503050406030204" pitchFamily="18" charset="0"/>
                                         <a:ea typeface="Cambria Math" panose="02040503050406030204" pitchFamily="18" charset="0"/>
@@ -25013,7 +26172,7 @@
                                     <m:r>
                                       <a:rPr lang="en-GB" sz="1400" b="0" i="1" smtClean="0">
                                         <a:solidFill>
-                                          <a:srgbClr val="FF0000"/>
+                                          <a:schemeClr val="tx1"/>
                                         </a:solidFill>
                                         <a:latin typeface="Cambria Math" panose="02040503050406030204" pitchFamily="18" charset="0"/>
                                         <a:ea typeface="Cambria Math" panose="02040503050406030204" pitchFamily="18" charset="0"/>
@@ -25025,7 +26184,7 @@
                                     <m:r>
                                       <a:rPr lang="en-GB" sz="1400" b="0" i="1" smtClean="0">
                                         <a:solidFill>
-                                          <a:srgbClr val="FF0000"/>
+                                          <a:schemeClr val="tx1"/>
                                         </a:solidFill>
                                         <a:latin typeface="Cambria Math" panose="02040503050406030204" pitchFamily="18" charset="0"/>
                                         <a:ea typeface="Cambria Math" panose="02040503050406030204" pitchFamily="18" charset="0"/>
@@ -25037,7 +26196,11 @@
                               </m:oMath>
                             </m:oMathPara>
                           </a14:m>
-                          <a:endParaRPr lang="en-GB" sz="1400" dirty="0"/>
+                          <a:endParaRPr lang="en-GB" sz="1400" dirty="0">
+                            <a:solidFill>
+                              <a:schemeClr val="tx1"/>
+                            </a:solidFill>
+                          </a:endParaRPr>
                         </a:p>
                       </a:txBody>
                       <a:tcPr/>
@@ -25102,7 +26265,7 @@
                                 <m:r>
                                   <a:rPr lang="en-GB" sz="1400" b="0" i="1" smtClean="0">
                                     <a:solidFill>
-                                      <a:srgbClr val="FF0000"/>
+                                      <a:schemeClr val="tx1"/>
                                     </a:solidFill>
                                     <a:latin typeface="Cambria Math" panose="02040503050406030204" pitchFamily="18" charset="0"/>
                                     <a:ea typeface="Cambria Math" panose="02040503050406030204" pitchFamily="18" charset="0"/>
@@ -25112,7 +26275,11 @@
                               </m:oMath>
                             </m:oMathPara>
                           </a14:m>
-                          <a:endParaRPr lang="en-GB" sz="1400" dirty="0"/>
+                          <a:endParaRPr lang="en-GB" sz="1400" dirty="0">
+                            <a:solidFill>
+                              <a:schemeClr val="tx1"/>
+                            </a:solidFill>
+                          </a:endParaRPr>
                         </a:p>
                       </a:txBody>
                       <a:tcPr/>
@@ -25185,7 +26352,7 @@
                                 <m:r>
                                   <a:rPr lang="en-GB" sz="1400" b="0" i="1" smtClean="0">
                                     <a:solidFill>
-                                      <a:srgbClr val="FF0000"/>
+                                      <a:schemeClr val="tx1"/>
                                     </a:solidFill>
                                     <a:latin typeface="Cambria Math" panose="02040503050406030204" pitchFamily="18" charset="0"/>
                                     <a:ea typeface="Cambria Math" panose="02040503050406030204" pitchFamily="18" charset="0"/>
@@ -25195,7 +26362,11 @@
                               </m:oMath>
                             </m:oMathPara>
                           </a14:m>
-                          <a:endParaRPr lang="en-GB" sz="1400" dirty="0"/>
+                          <a:endParaRPr lang="en-GB" sz="1400" dirty="0">
+                            <a:solidFill>
+                              <a:schemeClr val="tx1"/>
+                            </a:solidFill>
+                          </a:endParaRPr>
                         </a:p>
                       </a:txBody>
                       <a:tcPr/>
@@ -25279,7 +26450,7 @@
                                     <m:ctrlPr>
                                       <a:rPr lang="en-GB" sz="1400" i="1" smtClean="0">
                                         <a:solidFill>
-                                          <a:srgbClr val="FF0000"/>
+                                          <a:schemeClr val="tx1"/>
                                         </a:solidFill>
                                         <a:latin typeface="Cambria Math" panose="02040503050406030204" pitchFamily="18" charset="0"/>
                                         <a:ea typeface="Cambria Math" panose="02040503050406030204" pitchFamily="18" charset="0"/>
@@ -25290,7 +26461,7 @@
                                     <m:r>
                                       <a:rPr lang="en-GB" sz="1400" i="1">
                                         <a:solidFill>
-                                          <a:srgbClr val="FF0000"/>
+                                          <a:schemeClr val="tx1"/>
                                         </a:solidFill>
                                         <a:latin typeface="Cambria Math" panose="02040503050406030204" pitchFamily="18" charset="0"/>
                                         <a:ea typeface="Cambria Math" panose="02040503050406030204" pitchFamily="18" charset="0"/>
@@ -25302,7 +26473,7 @@
                                     <m:r>
                                       <a:rPr lang="en-GB" sz="1400" i="1">
                                         <a:solidFill>
-                                          <a:srgbClr val="FF0000"/>
+                                          <a:schemeClr val="tx1"/>
                                         </a:solidFill>
                                         <a:latin typeface="Cambria Math" panose="02040503050406030204" pitchFamily="18" charset="0"/>
                                         <a:ea typeface="Cambria Math" panose="02040503050406030204" pitchFamily="18" charset="0"/>
@@ -25314,7 +26485,11 @@
                               </m:oMath>
                             </m:oMathPara>
                           </a14:m>
-                          <a:endParaRPr lang="en-GB" sz="1400" dirty="0"/>
+                          <a:endParaRPr lang="en-GB" sz="1400" dirty="0">
+                            <a:solidFill>
+                              <a:schemeClr val="tx1"/>
+                            </a:solidFill>
+                          </a:endParaRPr>
                         </a:p>
                       </a:txBody>
                       <a:tcPr/>
@@ -25384,7 +26559,7 @@
                                 <m:r>
                                   <a:rPr lang="en-GB" sz="1400" b="0" i="1" smtClean="0">
                                     <a:solidFill>
-                                      <a:srgbClr val="FF0000"/>
+                                      <a:schemeClr val="tx1"/>
                                     </a:solidFill>
                                     <a:latin typeface="Cambria Math" panose="02040503050406030204" pitchFamily="18" charset="0"/>
                                   </a:rPr>
@@ -25393,7 +26568,11 @@
                               </m:oMath>
                             </m:oMathPara>
                           </a14:m>
-                          <a:endParaRPr lang="en-GB" sz="1400" dirty="0"/>
+                          <a:endParaRPr lang="en-GB" sz="1400" dirty="0">
+                            <a:solidFill>
+                              <a:schemeClr val="tx1"/>
+                            </a:solidFill>
+                          </a:endParaRPr>
                         </a:p>
                       </a:txBody>
                       <a:tcPr/>
@@ -25458,7 +26637,7 @@
                                 <m:r>
                                   <a:rPr lang="en-GB" sz="1400" b="0" i="1" smtClean="0">
                                     <a:solidFill>
-                                      <a:srgbClr val="FF0000"/>
+                                      <a:schemeClr val="tx1"/>
                                     </a:solidFill>
                                     <a:latin typeface="Cambria Math" panose="02040503050406030204" pitchFamily="18" charset="0"/>
                                     <a:ea typeface="Cambria Math" panose="02040503050406030204" pitchFamily="18" charset="0"/>
@@ -25468,7 +26647,11 @@
                               </m:oMath>
                             </m:oMathPara>
                           </a14:m>
-                          <a:endParaRPr lang="en-GB" sz="1400" dirty="0"/>
+                          <a:endParaRPr lang="en-GB" sz="1400" dirty="0">
+                            <a:solidFill>
+                              <a:schemeClr val="tx1"/>
+                            </a:solidFill>
+                          </a:endParaRPr>
                         </a:p>
                       </a:txBody>
                       <a:tcPr/>
@@ -25579,7 +26762,7 @@
                                 <m:r>
                                   <a:rPr lang="en-GB" sz="1400" i="1" smtClean="0">
                                     <a:solidFill>
-                                      <a:srgbClr val="FF0000"/>
+                                      <a:schemeClr val="tx1"/>
                                     </a:solidFill>
                                     <a:latin typeface="Cambria Math" panose="02040503050406030204" pitchFamily="18" charset="0"/>
                                     <a:ea typeface="Cambria Math" panose="02040503050406030204" pitchFamily="18" charset="0"/>
@@ -25589,7 +26772,11 @@
                               </m:oMath>
                             </m:oMathPara>
                           </a14:m>
-                          <a:endParaRPr lang="en-GB" sz="1400" dirty="0"/>
+                          <a:endParaRPr lang="en-GB" sz="1400" dirty="0">
+                            <a:solidFill>
+                              <a:schemeClr val="tx1"/>
+                            </a:solidFill>
+                          </a:endParaRPr>
                         </a:p>
                       </a:txBody>
                       <a:tcPr/>
@@ -25702,7 +26889,7 @@
                                     <m:ctrlPr>
                                       <a:rPr lang="en-GB" sz="1400" i="1" smtClean="0">
                                         <a:solidFill>
-                                          <a:srgbClr val="FF0000"/>
+                                          <a:schemeClr val="tx1"/>
                                         </a:solidFill>
                                         <a:latin typeface="Cambria Math" panose="02040503050406030204" pitchFamily="18" charset="0"/>
                                         <a:ea typeface="Cambria Math" panose="02040503050406030204" pitchFamily="18" charset="0"/>
@@ -25713,7 +26900,7 @@
                                     <m:r>
                                       <a:rPr lang="en-GB" sz="1400" i="1">
                                         <a:solidFill>
-                                          <a:srgbClr val="FF0000"/>
+                                          <a:schemeClr val="tx1"/>
                                         </a:solidFill>
                                         <a:latin typeface="Cambria Math" panose="02040503050406030204" pitchFamily="18" charset="0"/>
                                         <a:ea typeface="Cambria Math" panose="02040503050406030204" pitchFamily="18" charset="0"/>
@@ -25725,7 +26912,7 @@
                                     <m:r>
                                       <a:rPr lang="en-GB" sz="1400" i="1">
                                         <a:solidFill>
-                                          <a:srgbClr val="FF0000"/>
+                                          <a:schemeClr val="tx1"/>
                                         </a:solidFill>
                                         <a:latin typeface="Cambria Math" panose="02040503050406030204" pitchFamily="18" charset="0"/>
                                         <a:ea typeface="Cambria Math" panose="02040503050406030204" pitchFamily="18" charset="0"/>
@@ -25737,7 +26924,11 @@
                               </m:oMath>
                             </m:oMathPara>
                           </a14:m>
-                          <a:endParaRPr lang="en-GB" sz="1400" dirty="0"/>
+                          <a:endParaRPr lang="en-GB" sz="1400" dirty="0">
+                            <a:solidFill>
+                              <a:schemeClr val="tx1"/>
+                            </a:solidFill>
+                          </a:endParaRPr>
                         </a:p>
                       </a:txBody>
                       <a:tcPr/>
@@ -25846,7 +27037,7 @@
               <p:nvPr>
                 <p:extLst>
                   <p:ext uri="{D42A27DB-BD31-4B8C-83A1-F6EECF244321}">
-                    <p14:modId xmlns:p14="http://schemas.microsoft.com/office/powerpoint/2010/main" val="448772060"/>
+                    <p14:modId xmlns:p14="http://schemas.microsoft.com/office/powerpoint/2010/main" val="4203786460"/>
                   </p:ext>
                 </p:extLst>
               </p:nvPr>
@@ -26825,7 +28016,7 @@
 </p:sld>
 </file>
 
-<file path=ppt/slides/slide22.xml><?xml version="1.0" encoding="utf-8"?>
+<file path=ppt/slides/slide23.xml><?xml version="1.0" encoding="utf-8"?>
 <p:sld xmlns:a="http://schemas.openxmlformats.org/drawingml/2006/main" xmlns:r="http://schemas.openxmlformats.org/officeDocument/2006/relationships" xmlns:p="http://schemas.openxmlformats.org/presentationml/2006/main">
   <p:cSld>
     <p:spTree>
@@ -26842,706 +28033,910 @@
           <a:chExt cx="0" cy="0"/>
         </a:xfrm>
       </p:grpSpPr>
-      <mc:AlternateContent xmlns:mc="http://schemas.openxmlformats.org/markup-compatibility/2006">
-        <mc:Choice xmlns:a14="http://schemas.microsoft.com/office/drawing/2010/main" Requires="a14">
-          <p:sp>
-            <p:nvSpPr>
-              <p:cNvPr id="18" name="TextBox 17">
-                <a:extLst>
-                  <a:ext uri="{FF2B5EF4-FFF2-40B4-BE49-F238E27FC236}">
-                    <a16:creationId xmlns:a16="http://schemas.microsoft.com/office/drawing/2014/main" id="{50ACD8AA-203A-41F6-B9E1-92413A2008BB}"/>
-                  </a:ext>
-                </a:extLst>
-              </p:cNvPr>
-              <p:cNvSpPr txBox="1"/>
-              <p:nvPr/>
-            </p:nvSpPr>
-            <p:spPr>
-              <a:xfrm>
-                <a:off x="183005" y="235261"/>
-                <a:ext cx="8579785" cy="298928"/>
-              </a:xfrm>
-              <a:prstGeom prst="rect">
-                <a:avLst/>
-              </a:prstGeom>
-              <a:noFill/>
-            </p:spPr>
-            <p:txBody>
-              <a:bodyPr wrap="square" lIns="0" tIns="0" rIns="0" bIns="0" rtlCol="0">
-                <a:spAutoFit/>
-              </a:bodyPr>
-              <a:lstStyle/>
-              <a:p>
-                <a:pPr/>
-                <a14:m>
-                  <m:oMathPara xmlns:m="http://schemas.openxmlformats.org/officeDocument/2006/math">
-                    <m:oMathParaPr>
-                      <m:jc m:val="left"/>
-                    </m:oMathParaPr>
-                    <m:oMath xmlns:m="http://schemas.openxmlformats.org/officeDocument/2006/math">
-                      <m:r>
-                        <a:rPr lang="en-GB" i="1">
-                          <a:latin typeface="Cambria Math" panose="02040503050406030204" pitchFamily="18" charset="0"/>
-                        </a:rPr>
-                        <m:t>𝐷𝑂</m:t>
-                      </m:r>
-                      <m:d>
-                        <m:dPr>
-                          <m:ctrlPr>
-                            <a:rPr lang="en-GB" i="1">
-                              <a:latin typeface="Cambria Math" panose="02040503050406030204" pitchFamily="18" charset="0"/>
-                            </a:rPr>
-                          </m:ctrlPr>
-                        </m:dPr>
-                        <m:e>
-                          <m:r>
-                            <a:rPr lang="en-GB" i="1">
-                              <a:latin typeface="Cambria Math" panose="02040503050406030204" pitchFamily="18" charset="0"/>
-                            </a:rPr>
-                            <m:t>𝑡</m:t>
-                          </m:r>
-                        </m:e>
-                      </m:d>
-                      <m:r>
-                        <a:rPr lang="en-GB" i="1">
-                          <a:latin typeface="Cambria Math" panose="02040503050406030204" pitchFamily="18" charset="0"/>
-                        </a:rPr>
-                        <m:t>=</m:t>
-                      </m:r>
-                      <m:r>
-                        <a:rPr lang="en-GB" i="1">
-                          <a:latin typeface="Cambria Math" panose="02040503050406030204" pitchFamily="18" charset="0"/>
-                        </a:rPr>
-                        <m:t>𝐷𝑂</m:t>
-                      </m:r>
-                      <m:d>
-                        <m:dPr>
-                          <m:ctrlPr>
-                            <a:rPr lang="en-GB" i="1">
-                              <a:latin typeface="Cambria Math" panose="02040503050406030204" pitchFamily="18" charset="0"/>
-                            </a:rPr>
-                          </m:ctrlPr>
-                        </m:dPr>
-                        <m:e>
-                          <m:r>
-                            <a:rPr lang="en-GB" i="1">
-                              <a:latin typeface="Cambria Math" panose="02040503050406030204" pitchFamily="18" charset="0"/>
-                            </a:rPr>
-                            <m:t>𝑡</m:t>
-                          </m:r>
-                          <m:r>
-                            <a:rPr lang="en-GB" i="1">
-                              <a:latin typeface="Cambria Math" panose="02040503050406030204" pitchFamily="18" charset="0"/>
-                            </a:rPr>
-                            <m:t>−1</m:t>
-                          </m:r>
-                        </m:e>
-                      </m:d>
-                      <m:r>
-                        <a:rPr lang="en-GB" i="1">
-                          <a:latin typeface="Cambria Math" panose="02040503050406030204" pitchFamily="18" charset="0"/>
-                        </a:rPr>
-                        <m:t>+ </m:t>
-                      </m:r>
-                      <m:r>
-                        <a:rPr lang="en-GB" i="1">
-                          <a:latin typeface="Cambria Math" panose="02040503050406030204" pitchFamily="18" charset="0"/>
-                        </a:rPr>
-                        <m:t>𝑁𝑃𝑃</m:t>
-                      </m:r>
-                      <m:d>
-                        <m:dPr>
-                          <m:ctrlPr>
-                            <a:rPr lang="en-GB" i="1">
-                              <a:latin typeface="Cambria Math" panose="02040503050406030204" pitchFamily="18" charset="0"/>
-                            </a:rPr>
-                          </m:ctrlPr>
-                        </m:dPr>
-                        <m:e>
-                          <m:r>
-                            <a:rPr lang="en-GB" i="1">
-                              <a:latin typeface="Cambria Math" panose="02040503050406030204" pitchFamily="18" charset="0"/>
-                            </a:rPr>
-                            <m:t>𝑡</m:t>
-                          </m:r>
-                          <m:r>
-                            <a:rPr lang="en-GB" i="1">
-                              <a:latin typeface="Cambria Math" panose="02040503050406030204" pitchFamily="18" charset="0"/>
-                            </a:rPr>
-                            <m:t>−1</m:t>
-                          </m:r>
-                        </m:e>
-                      </m:d>
-                      <m:r>
-                        <a:rPr lang="en-GB" i="1">
-                          <a:latin typeface="Cambria Math" panose="02040503050406030204" pitchFamily="18" charset="0"/>
-                        </a:rPr>
-                        <m:t>−(</m:t>
-                      </m:r>
-                      <m:sSub>
-                        <m:sSubPr>
-                          <m:ctrlPr>
-                            <a:rPr lang="en-GB" i="1">
-                              <a:latin typeface="Cambria Math" panose="02040503050406030204" pitchFamily="18" charset="0"/>
-                            </a:rPr>
-                          </m:ctrlPr>
-                        </m:sSubPr>
-                        <m:e>
-                          <m:r>
-                            <a:rPr lang="en-GB" i="1">
-                              <a:latin typeface="Cambria Math" panose="02040503050406030204" pitchFamily="18" charset="0"/>
-                            </a:rPr>
-                            <m:t>𝑅</m:t>
-                          </m:r>
-                        </m:e>
-                        <m:sub>
-                          <m:r>
-                            <a:rPr lang="en-GB" i="1">
-                              <a:latin typeface="Cambria Math" panose="02040503050406030204" pitchFamily="18" charset="0"/>
-                            </a:rPr>
-                            <m:t>𝑝h𝑦𝑡𝑜</m:t>
-                          </m:r>
-                        </m:sub>
-                      </m:sSub>
-                      <m:d>
-                        <m:dPr>
-                          <m:ctrlPr>
-                            <a:rPr lang="en-GB" i="1">
-                              <a:latin typeface="Cambria Math" panose="02040503050406030204" pitchFamily="18" charset="0"/>
-                            </a:rPr>
-                          </m:ctrlPr>
-                        </m:dPr>
-                        <m:e>
-                          <m:r>
-                            <a:rPr lang="en-GB" i="1">
-                              <a:latin typeface="Cambria Math" panose="02040503050406030204" pitchFamily="18" charset="0"/>
-                            </a:rPr>
-                            <m:t>𝑡</m:t>
-                          </m:r>
-                          <m:r>
-                            <a:rPr lang="en-GB" i="1">
-                              <a:latin typeface="Cambria Math" panose="02040503050406030204" pitchFamily="18" charset="0"/>
-                            </a:rPr>
-                            <m:t>−1</m:t>
-                          </m:r>
-                        </m:e>
-                      </m:d>
-                      <m:r>
-                        <m:rPr>
-                          <m:nor/>
-                        </m:rPr>
-                        <a:rPr lang="en-GB" dirty="0">
-                          <a:latin typeface="Cambria Math" panose="02040503050406030204" pitchFamily="18" charset="0"/>
-                        </a:rPr>
-                        <m:t>+ </m:t>
-                      </m:r>
-                      <m:sSub>
-                        <m:sSubPr>
-                          <m:ctrlPr>
-                            <a:rPr lang="en-GB" i="1">
-                              <a:latin typeface="Cambria Math" panose="02040503050406030204" pitchFamily="18" charset="0"/>
-                            </a:rPr>
-                          </m:ctrlPr>
-                        </m:sSubPr>
-                        <m:e>
-                          <m:r>
-                            <a:rPr lang="en-GB" i="1">
-                              <a:latin typeface="Cambria Math" panose="02040503050406030204" pitchFamily="18" charset="0"/>
-                            </a:rPr>
-                            <m:t>𝑅</m:t>
-                          </m:r>
-                        </m:e>
-                        <m:sub>
-                          <m:r>
-                            <a:rPr lang="en-GB" i="1">
-                              <a:latin typeface="Cambria Math" panose="02040503050406030204" pitchFamily="18" charset="0"/>
-                            </a:rPr>
-                            <m:t>𝐷𝑂𝐶</m:t>
-                          </m:r>
-                        </m:sub>
-                      </m:sSub>
-                      <m:d>
-                        <m:dPr>
-                          <m:ctrlPr>
-                            <a:rPr lang="en-GB" i="1">
-                              <a:latin typeface="Cambria Math" panose="02040503050406030204" pitchFamily="18" charset="0"/>
-                            </a:rPr>
-                          </m:ctrlPr>
-                        </m:dPr>
-                        <m:e>
-                          <m:r>
-                            <a:rPr lang="en-GB" i="1">
-                              <a:latin typeface="Cambria Math" panose="02040503050406030204" pitchFamily="18" charset="0"/>
-                            </a:rPr>
-                            <m:t>𝑡</m:t>
-                          </m:r>
-                          <m:r>
-                            <a:rPr lang="en-GB" i="1">
-                              <a:latin typeface="Cambria Math" panose="02040503050406030204" pitchFamily="18" charset="0"/>
-                            </a:rPr>
-                            <m:t>−1</m:t>
-                          </m:r>
-                        </m:e>
-                      </m:d>
-                      <m:r>
-                        <a:rPr lang="en-GB" i="1">
-                          <a:latin typeface="Cambria Math" panose="02040503050406030204" pitchFamily="18" charset="0"/>
-                        </a:rPr>
-                        <m:t>)+</m:t>
-                      </m:r>
-                      <m:sSub>
-                        <m:sSubPr>
-                          <m:ctrlPr>
-                            <a:rPr lang="en-GB" i="1">
-                              <a:latin typeface="Cambria Math" panose="02040503050406030204" pitchFamily="18" charset="0"/>
-                            </a:rPr>
-                          </m:ctrlPr>
-                        </m:sSubPr>
-                        <m:e>
-                          <m:r>
-                            <a:rPr lang="en-GB" i="1">
-                              <a:latin typeface="Cambria Math" panose="02040503050406030204" pitchFamily="18" charset="0"/>
-                            </a:rPr>
-                            <m:t>𝐹</m:t>
-                          </m:r>
-                        </m:e>
-                        <m:sub>
-                          <m:r>
-                            <a:rPr lang="en-GB" i="1">
-                              <a:latin typeface="Cambria Math" panose="02040503050406030204" pitchFamily="18" charset="0"/>
-                            </a:rPr>
-                            <m:t>𝑎𝑡𝑚</m:t>
-                          </m:r>
-                        </m:sub>
-                      </m:sSub>
-                      <m:d>
-                        <m:dPr>
-                          <m:ctrlPr>
-                            <a:rPr lang="en-GB" i="1">
-                              <a:latin typeface="Cambria Math" panose="02040503050406030204" pitchFamily="18" charset="0"/>
-                            </a:rPr>
-                          </m:ctrlPr>
-                        </m:dPr>
-                        <m:e>
-                          <m:r>
-                            <a:rPr lang="en-GB" i="1">
-                              <a:latin typeface="Cambria Math" panose="02040503050406030204" pitchFamily="18" charset="0"/>
-                            </a:rPr>
-                            <m:t>𝑡</m:t>
-                          </m:r>
-                          <m:r>
-                            <a:rPr lang="en-GB" i="1">
-                              <a:latin typeface="Cambria Math" panose="02040503050406030204" pitchFamily="18" charset="0"/>
-                            </a:rPr>
-                            <m:t>−1</m:t>
-                          </m:r>
-                        </m:e>
-                      </m:d>
-                    </m:oMath>
-                  </m:oMathPara>
-                </a14:m>
-                <a:endParaRPr lang="en-GB" dirty="0"/>
-              </a:p>
-            </p:txBody>
-          </p:sp>
-        </mc:Choice>
-        <mc:Fallback>
-          <p:sp>
-            <p:nvSpPr>
-              <p:cNvPr id="18" name="TextBox 17">
-                <a:extLst>
-                  <a:ext uri="{FF2B5EF4-FFF2-40B4-BE49-F238E27FC236}">
-                    <a16:creationId xmlns:a16="http://schemas.microsoft.com/office/drawing/2014/main" id="{50ACD8AA-203A-41F6-B9E1-92413A2008BB}"/>
-                  </a:ext>
-                </a:extLst>
-              </p:cNvPr>
-              <p:cNvSpPr txBox="1">
-                <a:spLocks noRot="1" noChangeAspect="1" noMove="1" noResize="1" noEditPoints="1" noAdjustHandles="1" noChangeArrowheads="1" noChangeShapeType="1" noTextEdit="1"/>
-              </p:cNvSpPr>
-              <p:nvPr/>
-            </p:nvSpPr>
-            <p:spPr>
-              <a:xfrm>
-                <a:off x="183005" y="235261"/>
-                <a:ext cx="8579785" cy="298928"/>
-              </a:xfrm>
-              <a:prstGeom prst="rect">
-                <a:avLst/>
-              </a:prstGeom>
-              <a:blipFill>
-                <a:blip r:embed="rId2"/>
-                <a:stretch>
-                  <a:fillRect l="-924" t="-2041" b="-26531"/>
-                </a:stretch>
-              </a:blipFill>
-            </p:spPr>
-            <p:txBody>
-              <a:bodyPr/>
-              <a:lstStyle/>
-              <a:p>
-                <a:r>
-                  <a:rPr lang="en-GB">
-                    <a:noFill/>
-                  </a:rPr>
-                  <a:t> </a:t>
-                </a:r>
-              </a:p>
-            </p:txBody>
-          </p:sp>
-        </mc:Fallback>
-      </mc:AlternateContent>
-      <mc:AlternateContent xmlns:mc="http://schemas.openxmlformats.org/markup-compatibility/2006">
-        <mc:Choice xmlns:a14="http://schemas.microsoft.com/office/drawing/2010/main" Requires="a14">
-          <p:sp>
-            <p:nvSpPr>
-              <p:cNvPr id="19" name="TextBox 18">
-                <a:extLst>
-                  <a:ext uri="{FF2B5EF4-FFF2-40B4-BE49-F238E27FC236}">
-                    <a16:creationId xmlns:a16="http://schemas.microsoft.com/office/drawing/2014/main" id="{643EF535-3EE6-4536-BD64-C434C3675577}"/>
-                  </a:ext>
-                </a:extLst>
-              </p:cNvPr>
-              <p:cNvSpPr txBox="1"/>
-              <p:nvPr/>
-            </p:nvSpPr>
-            <p:spPr>
-              <a:xfrm>
-                <a:off x="183005" y="781944"/>
-                <a:ext cx="8579785" cy="298928"/>
-              </a:xfrm>
-              <a:prstGeom prst="rect">
-                <a:avLst/>
-              </a:prstGeom>
-              <a:noFill/>
-            </p:spPr>
-            <p:txBody>
-              <a:bodyPr wrap="square" lIns="0" tIns="0" rIns="0" bIns="0" rtlCol="0">
-                <a:spAutoFit/>
-              </a:bodyPr>
-              <a:lstStyle/>
-              <a:p>
-                <a:pPr/>
-                <a14:m>
-                  <m:oMathPara xmlns:m="http://schemas.openxmlformats.org/officeDocument/2006/math">
-                    <m:oMathParaPr>
-                      <m:jc m:val="left"/>
-                    </m:oMathParaPr>
-                    <m:oMath xmlns:m="http://schemas.openxmlformats.org/officeDocument/2006/math">
-                      <m:r>
-                        <a:rPr lang="en-GB" i="1">
-                          <a:latin typeface="Cambria Math" panose="02040503050406030204" pitchFamily="18" charset="0"/>
-                        </a:rPr>
-                        <m:t>𝐷𝑂</m:t>
-                      </m:r>
-                      <m:d>
-                        <m:dPr>
-                          <m:ctrlPr>
-                            <a:rPr lang="en-GB" i="1">
-                              <a:latin typeface="Cambria Math" panose="02040503050406030204" pitchFamily="18" charset="0"/>
-                            </a:rPr>
-                          </m:ctrlPr>
-                        </m:dPr>
-                        <m:e>
-                          <m:r>
-                            <a:rPr lang="en-GB" i="1">
-                              <a:latin typeface="Cambria Math" panose="02040503050406030204" pitchFamily="18" charset="0"/>
-                            </a:rPr>
-                            <m:t>𝑡</m:t>
-                          </m:r>
-                        </m:e>
-                      </m:d>
-                      <m:r>
-                        <a:rPr lang="en-GB" i="1">
-                          <a:latin typeface="Cambria Math" panose="02040503050406030204" pitchFamily="18" charset="0"/>
-                        </a:rPr>
-                        <m:t>=</m:t>
-                      </m:r>
-                      <m:r>
-                        <a:rPr lang="en-GB" i="1">
-                          <a:latin typeface="Cambria Math" panose="02040503050406030204" pitchFamily="18" charset="0"/>
-                        </a:rPr>
-                        <m:t>𝐷𝑂</m:t>
-                      </m:r>
-                      <m:d>
-                        <m:dPr>
-                          <m:ctrlPr>
-                            <a:rPr lang="en-GB" i="1">
-                              <a:latin typeface="Cambria Math" panose="02040503050406030204" pitchFamily="18" charset="0"/>
-                            </a:rPr>
-                          </m:ctrlPr>
-                        </m:dPr>
-                        <m:e>
-                          <m:r>
-                            <a:rPr lang="en-GB" i="1">
-                              <a:latin typeface="Cambria Math" panose="02040503050406030204" pitchFamily="18" charset="0"/>
-                            </a:rPr>
-                            <m:t>𝑡</m:t>
-                          </m:r>
-                          <m:r>
-                            <a:rPr lang="en-GB" i="1">
-                              <a:latin typeface="Cambria Math" panose="02040503050406030204" pitchFamily="18" charset="0"/>
-                            </a:rPr>
-                            <m:t>−1</m:t>
-                          </m:r>
-                        </m:e>
-                      </m:d>
-                      <m:r>
-                        <a:rPr lang="en-GB" i="1">
-                          <a:latin typeface="Cambria Math" panose="02040503050406030204" pitchFamily="18" charset="0"/>
-                        </a:rPr>
-                        <m:t>+ </m:t>
-                      </m:r>
-                      <m:r>
-                        <a:rPr lang="en-GB" i="1">
-                          <a:latin typeface="Cambria Math" panose="02040503050406030204" pitchFamily="18" charset="0"/>
-                        </a:rPr>
-                        <m:t>𝑁𝑃𝑃</m:t>
-                      </m:r>
-                      <m:d>
-                        <m:dPr>
-                          <m:ctrlPr>
-                            <a:rPr lang="en-GB" i="1">
-                              <a:latin typeface="Cambria Math" panose="02040503050406030204" pitchFamily="18" charset="0"/>
-                            </a:rPr>
-                          </m:ctrlPr>
-                        </m:dPr>
-                        <m:e>
-                          <m:r>
-                            <a:rPr lang="en-GB" i="1">
-                              <a:latin typeface="Cambria Math" panose="02040503050406030204" pitchFamily="18" charset="0"/>
-                            </a:rPr>
-                            <m:t>𝑡</m:t>
-                          </m:r>
-                          <m:r>
-                            <a:rPr lang="en-GB" i="1">
-                              <a:latin typeface="Cambria Math" panose="02040503050406030204" pitchFamily="18" charset="0"/>
-                            </a:rPr>
-                            <m:t>−1</m:t>
-                          </m:r>
-                        </m:e>
-                      </m:d>
-                      <m:r>
-                        <a:rPr lang="en-GB" i="1">
-                          <a:latin typeface="Cambria Math" panose="02040503050406030204" pitchFamily="18" charset="0"/>
-                        </a:rPr>
-                        <m:t>−(</m:t>
-                      </m:r>
-                      <m:sSub>
-                        <m:sSubPr>
-                          <m:ctrlPr>
-                            <a:rPr lang="en-GB" i="1">
-                              <a:latin typeface="Cambria Math" panose="02040503050406030204" pitchFamily="18" charset="0"/>
-                            </a:rPr>
-                          </m:ctrlPr>
-                        </m:sSubPr>
-                        <m:e>
-                          <m:r>
-                            <a:rPr lang="en-GB" i="1">
-                              <a:latin typeface="Cambria Math" panose="02040503050406030204" pitchFamily="18" charset="0"/>
-                            </a:rPr>
-                            <m:t>𝑅</m:t>
-                          </m:r>
-                        </m:e>
-                        <m:sub>
-                          <m:r>
-                            <a:rPr lang="en-GB" i="1">
-                              <a:latin typeface="Cambria Math" panose="02040503050406030204" pitchFamily="18" charset="0"/>
-                            </a:rPr>
-                            <m:t>𝑝h𝑦𝑡𝑜</m:t>
-                          </m:r>
-                        </m:sub>
-                      </m:sSub>
-                      <m:d>
-                        <m:dPr>
-                          <m:ctrlPr>
-                            <a:rPr lang="en-GB" i="1">
-                              <a:latin typeface="Cambria Math" panose="02040503050406030204" pitchFamily="18" charset="0"/>
-                            </a:rPr>
-                          </m:ctrlPr>
-                        </m:dPr>
-                        <m:e>
-                          <m:r>
-                            <a:rPr lang="en-GB" i="1">
-                              <a:latin typeface="Cambria Math" panose="02040503050406030204" pitchFamily="18" charset="0"/>
-                            </a:rPr>
-                            <m:t>𝑡</m:t>
-                          </m:r>
-                          <m:r>
-                            <a:rPr lang="en-GB" i="1">
-                              <a:latin typeface="Cambria Math" panose="02040503050406030204" pitchFamily="18" charset="0"/>
-                            </a:rPr>
-                            <m:t>−1</m:t>
-                          </m:r>
-                        </m:e>
-                      </m:d>
-                      <m:r>
-                        <m:rPr>
-                          <m:nor/>
-                        </m:rPr>
-                        <a:rPr lang="en-GB" dirty="0">
-                          <a:latin typeface="Cambria Math" panose="02040503050406030204" pitchFamily="18" charset="0"/>
-                        </a:rPr>
-                        <m:t>+ </m:t>
-                      </m:r>
-                      <m:sSub>
-                        <m:sSubPr>
-                          <m:ctrlPr>
-                            <a:rPr lang="en-GB" i="1">
-                              <a:latin typeface="Cambria Math" panose="02040503050406030204" pitchFamily="18" charset="0"/>
-                            </a:rPr>
-                          </m:ctrlPr>
-                        </m:sSubPr>
-                        <m:e>
-                          <m:r>
-                            <a:rPr lang="en-GB" i="1">
-                              <a:latin typeface="Cambria Math" panose="02040503050406030204" pitchFamily="18" charset="0"/>
-                            </a:rPr>
-                            <m:t>𝑅</m:t>
-                          </m:r>
-                        </m:e>
-                        <m:sub>
-                          <m:r>
-                            <a:rPr lang="en-GB" i="1">
-                              <a:latin typeface="Cambria Math" panose="02040503050406030204" pitchFamily="18" charset="0"/>
-                            </a:rPr>
-                            <m:t>𝐷𝑂𝐶</m:t>
-                          </m:r>
-                        </m:sub>
-                      </m:sSub>
-                      <m:d>
-                        <m:dPr>
-                          <m:ctrlPr>
-                            <a:rPr lang="en-GB" i="1">
-                              <a:latin typeface="Cambria Math" panose="02040503050406030204" pitchFamily="18" charset="0"/>
-                            </a:rPr>
-                          </m:ctrlPr>
-                        </m:dPr>
-                        <m:e>
-                          <m:r>
-                            <a:rPr lang="en-GB" i="1">
-                              <a:latin typeface="Cambria Math" panose="02040503050406030204" pitchFamily="18" charset="0"/>
-                            </a:rPr>
-                            <m:t>𝑡</m:t>
-                          </m:r>
-                          <m:r>
-                            <a:rPr lang="en-GB" i="1">
-                              <a:latin typeface="Cambria Math" panose="02040503050406030204" pitchFamily="18" charset="0"/>
-                            </a:rPr>
-                            <m:t>−1</m:t>
-                          </m:r>
-                        </m:e>
-                      </m:d>
-                      <m:r>
-                        <a:rPr lang="en-GB" i="1">
-                          <a:latin typeface="Cambria Math" panose="02040503050406030204" pitchFamily="18" charset="0"/>
-                        </a:rPr>
-                        <m:t>)+</m:t>
-                      </m:r>
-                      <m:sSub>
-                        <m:sSubPr>
-                          <m:ctrlPr>
-                            <a:rPr lang="en-GB" i="1">
-                              <a:latin typeface="Cambria Math" panose="02040503050406030204" pitchFamily="18" charset="0"/>
-                            </a:rPr>
-                          </m:ctrlPr>
-                        </m:sSubPr>
-                        <m:e>
-                          <m:r>
-                            <a:rPr lang="en-GB" i="1">
-                              <a:latin typeface="Cambria Math" panose="02040503050406030204" pitchFamily="18" charset="0"/>
-                            </a:rPr>
-                            <m:t>𝐹</m:t>
-                          </m:r>
-                        </m:e>
-                        <m:sub>
-                          <m:r>
-                            <a:rPr lang="en-GB" i="1">
-                              <a:latin typeface="Cambria Math" panose="02040503050406030204" pitchFamily="18" charset="0"/>
-                            </a:rPr>
-                            <m:t>𝑎𝑡𝑚</m:t>
-                          </m:r>
-                        </m:sub>
-                      </m:sSub>
-                      <m:d>
-                        <m:dPr>
-                          <m:ctrlPr>
-                            <a:rPr lang="en-GB" i="1">
-                              <a:latin typeface="Cambria Math" panose="02040503050406030204" pitchFamily="18" charset="0"/>
-                            </a:rPr>
-                          </m:ctrlPr>
-                        </m:dPr>
-                        <m:e>
-                          <m:r>
-                            <a:rPr lang="en-GB" i="1">
-                              <a:latin typeface="Cambria Math" panose="02040503050406030204" pitchFamily="18" charset="0"/>
-                            </a:rPr>
-                            <m:t>𝑡</m:t>
-                          </m:r>
-                          <m:r>
-                            <a:rPr lang="en-GB" i="1">
-                              <a:latin typeface="Cambria Math" panose="02040503050406030204" pitchFamily="18" charset="0"/>
-                            </a:rPr>
-                            <m:t>−1</m:t>
-                          </m:r>
-                        </m:e>
-                      </m:d>
-                    </m:oMath>
-                  </m:oMathPara>
-                </a14:m>
-                <a:endParaRPr lang="en-GB" dirty="0"/>
-              </a:p>
-            </p:txBody>
-          </p:sp>
-        </mc:Choice>
-        <mc:Fallback>
-          <p:sp>
-            <p:nvSpPr>
-              <p:cNvPr id="19" name="TextBox 18">
-                <a:extLst>
-                  <a:ext uri="{FF2B5EF4-FFF2-40B4-BE49-F238E27FC236}">
-                    <a16:creationId xmlns:a16="http://schemas.microsoft.com/office/drawing/2014/main" id="{643EF535-3EE6-4536-BD64-C434C3675577}"/>
-                  </a:ext>
-                </a:extLst>
-              </p:cNvPr>
-              <p:cNvSpPr txBox="1">
-                <a:spLocks noRot="1" noChangeAspect="1" noMove="1" noResize="1" noEditPoints="1" noAdjustHandles="1" noChangeArrowheads="1" noChangeShapeType="1" noTextEdit="1"/>
-              </p:cNvSpPr>
-              <p:nvPr/>
-            </p:nvSpPr>
-            <p:spPr>
-              <a:xfrm>
-                <a:off x="183005" y="781944"/>
-                <a:ext cx="8579785" cy="298928"/>
-              </a:xfrm>
-              <a:prstGeom prst="rect">
-                <a:avLst/>
-              </a:prstGeom>
-              <a:blipFill>
-                <a:blip r:embed="rId3"/>
-                <a:stretch>
-                  <a:fillRect l="-924" b="-26531"/>
-                </a:stretch>
-              </a:blipFill>
-            </p:spPr>
-            <p:txBody>
-              <a:bodyPr/>
-              <a:lstStyle/>
-              <a:p>
-                <a:r>
-                  <a:rPr lang="en-GB">
-                    <a:noFill/>
-                  </a:rPr>
-                  <a:t> </a:t>
-                </a:r>
-              </a:p>
-            </p:txBody>
-          </p:sp>
-        </mc:Fallback>
-      </mc:AlternateContent>
+      <p:sp>
+        <p:nvSpPr>
+          <p:cNvPr id="2" name="Title 1">
+            <a:extLst>
+              <a:ext uri="{FF2B5EF4-FFF2-40B4-BE49-F238E27FC236}">
+                <a16:creationId xmlns:a16="http://schemas.microsoft.com/office/drawing/2014/main" id="{E5074968-9788-4E0C-93A2-370918581B1E}"/>
+              </a:ext>
+            </a:extLst>
+          </p:cNvPr>
+          <p:cNvSpPr>
+            <a:spLocks noGrp="1"/>
+          </p:cNvSpPr>
+          <p:nvPr>
+            <p:ph type="title"/>
+          </p:nvPr>
+        </p:nvSpPr>
+        <p:spPr/>
+        <p:txBody>
+          <a:bodyPr/>
+          <a:lstStyle/>
+          <a:p>
+            <a:r>
+              <a:rPr lang="en-GB" dirty="0"/>
+              <a:t>Demo</a:t>
+            </a:r>
+          </a:p>
+        </p:txBody>
+      </p:sp>
+      <p:sp>
+        <p:nvSpPr>
+          <p:cNvPr id="4" name="TextBox 3">
+            <a:extLst>
+              <a:ext uri="{FF2B5EF4-FFF2-40B4-BE49-F238E27FC236}">
+                <a16:creationId xmlns:a16="http://schemas.microsoft.com/office/drawing/2014/main" id="{F0B7E2AD-600E-415B-965A-1B067375132F}"/>
+              </a:ext>
+            </a:extLst>
+          </p:cNvPr>
+          <p:cNvSpPr txBox="1"/>
+          <p:nvPr/>
+        </p:nvSpPr>
+        <p:spPr>
+          <a:xfrm>
+            <a:off x="485010" y="2130961"/>
+            <a:ext cx="6123792" cy="369332"/>
+          </a:xfrm>
+          <a:prstGeom prst="rect">
+            <a:avLst/>
+          </a:prstGeom>
+          <a:noFill/>
+        </p:spPr>
+        <p:txBody>
+          <a:bodyPr wrap="none" rtlCol="0">
+            <a:spAutoFit/>
+          </a:bodyPr>
+          <a:lstStyle/>
+          <a:p>
+            <a:r>
+              <a:rPr lang="en-GB" dirty="0">
+                <a:hlinkClick r:id="rId2"/>
+              </a:rPr>
+              <a:t>https://github.com/camilleminaudo/oxygen-model-demo</a:t>
+            </a:r>
+            <a:r>
+              <a:rPr lang="en-GB" dirty="0"/>
+              <a:t> </a:t>
+            </a:r>
+          </a:p>
+        </p:txBody>
+      </p:sp>
     </p:spTree>
     <p:extLst>
       <p:ext uri="{BB962C8B-B14F-4D97-AF65-F5344CB8AC3E}">
-        <p14:creationId xmlns:p14="http://schemas.microsoft.com/office/powerpoint/2010/main" val="1212510191"/>
+        <p14:creationId xmlns:p14="http://schemas.microsoft.com/office/powerpoint/2010/main" val="2661735550"/>
+      </p:ext>
+    </p:extLst>
+  </p:cSld>
+  <p:clrMapOvr>
+    <a:masterClrMapping/>
+  </p:clrMapOvr>
+</p:sld>
+</file>
+
+<file path=ppt/slides/slide24.xml><?xml version="1.0" encoding="utf-8"?>
+<p:sld xmlns:a="http://schemas.openxmlformats.org/drawingml/2006/main" xmlns:r="http://schemas.openxmlformats.org/officeDocument/2006/relationships" xmlns:p="http://schemas.openxmlformats.org/presentationml/2006/main">
+  <p:cSld>
+    <p:spTree>
+      <p:nvGrpSpPr>
+        <p:cNvPr id="1" name=""/>
+        <p:cNvGrpSpPr/>
+        <p:nvPr/>
+      </p:nvGrpSpPr>
+      <p:grpSpPr>
+        <a:xfrm>
+          <a:off x="0" y="0"/>
+          <a:ext cx="0" cy="0"/>
+          <a:chOff x="0" y="0"/>
+          <a:chExt cx="0" cy="0"/>
+        </a:xfrm>
+      </p:grpSpPr>
+      <p:sp>
+        <p:nvSpPr>
+          <p:cNvPr id="4" name="Title 3">
+            <a:extLst>
+              <a:ext uri="{FF2B5EF4-FFF2-40B4-BE49-F238E27FC236}">
+                <a16:creationId xmlns:a16="http://schemas.microsoft.com/office/drawing/2014/main" id="{31DC8417-75A3-4CB5-827F-2AD87699BE16}"/>
+              </a:ext>
+            </a:extLst>
+          </p:cNvPr>
+          <p:cNvSpPr>
+            <a:spLocks noGrp="1"/>
+          </p:cNvSpPr>
+          <p:nvPr>
+            <p:ph type="title"/>
+          </p:nvPr>
+        </p:nvSpPr>
+        <p:spPr/>
+        <p:txBody>
+          <a:bodyPr/>
+          <a:lstStyle/>
+          <a:p>
+            <a:r>
+              <a:rPr lang="en-GB" dirty="0"/>
+              <a:t>Part 2</a:t>
+            </a:r>
+          </a:p>
+        </p:txBody>
+      </p:sp>
+      <p:sp>
+        <p:nvSpPr>
+          <p:cNvPr id="5" name="Text Placeholder 4">
+            <a:extLst>
+              <a:ext uri="{FF2B5EF4-FFF2-40B4-BE49-F238E27FC236}">
+                <a16:creationId xmlns:a16="http://schemas.microsoft.com/office/drawing/2014/main" id="{0CE4BC3D-360D-4D11-BD1D-3573B5F251A0}"/>
+              </a:ext>
+            </a:extLst>
+          </p:cNvPr>
+          <p:cNvSpPr>
+            <a:spLocks noGrp="1"/>
+          </p:cNvSpPr>
+          <p:nvPr>
+            <p:ph type="body" idx="1"/>
+          </p:nvPr>
+        </p:nvSpPr>
+        <p:spPr/>
+        <p:txBody>
+          <a:bodyPr/>
+          <a:lstStyle/>
+          <a:p>
+            <a:r>
+              <a:rPr lang="en-GB" dirty="0"/>
+              <a:t>Model implementation</a:t>
+            </a:r>
+          </a:p>
+        </p:txBody>
+      </p:sp>
+    </p:spTree>
+    <p:extLst>
+      <p:ext uri="{BB962C8B-B14F-4D97-AF65-F5344CB8AC3E}">
+        <p14:creationId xmlns:p14="http://schemas.microsoft.com/office/powerpoint/2010/main" val="2633124219"/>
+      </p:ext>
+    </p:extLst>
+  </p:cSld>
+  <p:clrMapOvr>
+    <a:masterClrMapping/>
+  </p:clrMapOvr>
+</p:sld>
+</file>
+
+<file path=ppt/slides/slide25.xml><?xml version="1.0" encoding="utf-8"?>
+<p:sld xmlns:a="http://schemas.openxmlformats.org/drawingml/2006/main" xmlns:r="http://schemas.openxmlformats.org/officeDocument/2006/relationships" xmlns:p="http://schemas.openxmlformats.org/presentationml/2006/main">
+  <p:cSld>
+    <p:spTree>
+      <p:nvGrpSpPr>
+        <p:cNvPr id="1" name=""/>
+        <p:cNvGrpSpPr/>
+        <p:nvPr/>
+      </p:nvGrpSpPr>
+      <p:grpSpPr>
+        <a:xfrm>
+          <a:off x="0" y="0"/>
+          <a:ext cx="0" cy="0"/>
+          <a:chOff x="0" y="0"/>
+          <a:chExt cx="0" cy="0"/>
+        </a:xfrm>
+      </p:grpSpPr>
+      <p:sp>
+        <p:nvSpPr>
+          <p:cNvPr id="2" name="Title 1">
+            <a:extLst>
+              <a:ext uri="{FF2B5EF4-FFF2-40B4-BE49-F238E27FC236}">
+                <a16:creationId xmlns:a16="http://schemas.microsoft.com/office/drawing/2014/main" id="{2F909956-5898-4C58-8FC3-61225DB40F99}"/>
+              </a:ext>
+            </a:extLst>
+          </p:cNvPr>
+          <p:cNvSpPr>
+            <a:spLocks noGrp="1"/>
+          </p:cNvSpPr>
+          <p:nvPr>
+            <p:ph type="title"/>
+          </p:nvPr>
+        </p:nvSpPr>
+        <p:spPr/>
+        <p:txBody>
+          <a:bodyPr/>
+          <a:lstStyle/>
+          <a:p>
+            <a:r>
+              <a:rPr lang="en-GB" dirty="0"/>
+              <a:t>How are we doing this?</a:t>
+            </a:r>
+          </a:p>
+        </p:txBody>
+      </p:sp>
+      <p:pic>
+        <p:nvPicPr>
+          <p:cNvPr id="2050" name="Picture 2" descr="GitHub Logo: valor, história, PNG">
+            <a:extLst>
+              <a:ext uri="{FF2B5EF4-FFF2-40B4-BE49-F238E27FC236}">
+                <a16:creationId xmlns:a16="http://schemas.microsoft.com/office/drawing/2014/main" id="{4B108334-E1D1-414D-8BF3-E75B71927328}"/>
+              </a:ext>
+            </a:extLst>
+          </p:cNvPr>
+          <p:cNvPicPr>
+            <a:picLocks noChangeAspect="1" noChangeArrowheads="1"/>
+          </p:cNvPicPr>
+          <p:nvPr/>
+        </p:nvPicPr>
+        <p:blipFill>
+          <a:blip r:embed="rId2">
+            <a:extLst>
+              <a:ext uri="{28A0092B-C50C-407E-A947-70E740481C1C}">
+                <a14:useLocalDpi xmlns:a14="http://schemas.microsoft.com/office/drawing/2010/main" val="0"/>
+              </a:ext>
+            </a:extLst>
+          </a:blip>
+          <a:srcRect/>
+          <a:stretch>
+            <a:fillRect/>
+          </a:stretch>
+        </p:blipFill>
+        <p:spPr bwMode="auto">
+          <a:xfrm>
+            <a:off x="720666" y="2032086"/>
+            <a:ext cx="1175245" cy="659526"/>
+          </a:xfrm>
+          <a:prstGeom prst="rect">
+            <a:avLst/>
+          </a:prstGeom>
+          <a:noFill/>
+          <a:extLst>
+            <a:ext uri="{909E8E84-426E-40DD-AFC4-6F175D3DCCD1}">
+              <a14:hiddenFill xmlns:a14="http://schemas.microsoft.com/office/drawing/2010/main">
+                <a:solidFill>
+                  <a:srgbClr val="FFFFFF"/>
+                </a:solidFill>
+              </a14:hiddenFill>
+            </a:ext>
+          </a:extLst>
+        </p:spPr>
+      </p:pic>
+      <p:pic>
+        <p:nvPicPr>
+          <p:cNvPr id="2054" name="Picture 6" descr="RStudio Logo Usage Guidelines - RStudio">
+            <a:extLst>
+              <a:ext uri="{FF2B5EF4-FFF2-40B4-BE49-F238E27FC236}">
+                <a16:creationId xmlns:a16="http://schemas.microsoft.com/office/drawing/2014/main" id="{81BBE906-78F1-42F6-BEB7-59AC48FEF2CE}"/>
+              </a:ext>
+            </a:extLst>
+          </p:cNvPr>
+          <p:cNvPicPr>
+            <a:picLocks noChangeAspect="1" noChangeArrowheads="1"/>
+          </p:cNvPicPr>
+          <p:nvPr/>
+        </p:nvPicPr>
+        <p:blipFill>
+          <a:blip r:embed="rId3">
+            <a:extLst>
+              <a:ext uri="{28A0092B-C50C-407E-A947-70E740481C1C}">
+                <a14:useLocalDpi xmlns:a14="http://schemas.microsoft.com/office/drawing/2010/main" val="0"/>
+              </a:ext>
+            </a:extLst>
+          </a:blip>
+          <a:srcRect/>
+          <a:stretch>
+            <a:fillRect/>
+          </a:stretch>
+        </p:blipFill>
+        <p:spPr bwMode="auto">
+          <a:xfrm>
+            <a:off x="4776239" y="4543398"/>
+            <a:ext cx="1923662" cy="675620"/>
+          </a:xfrm>
+          <a:prstGeom prst="rect">
+            <a:avLst/>
+          </a:prstGeom>
+          <a:noFill/>
+          <a:extLst>
+            <a:ext uri="{909E8E84-426E-40DD-AFC4-6F175D3DCCD1}">
+              <a14:hiddenFill xmlns:a14="http://schemas.microsoft.com/office/drawing/2010/main">
+                <a:solidFill>
+                  <a:srgbClr val="FFFFFF"/>
+                </a:solidFill>
+              </a14:hiddenFill>
+            </a:ext>
+          </a:extLst>
+        </p:spPr>
+      </p:pic>
+      <p:pic>
+        <p:nvPicPr>
+          <p:cNvPr id="2056" name="Picture 8" descr="Binder">
+            <a:extLst>
+              <a:ext uri="{FF2B5EF4-FFF2-40B4-BE49-F238E27FC236}">
+                <a16:creationId xmlns:a16="http://schemas.microsoft.com/office/drawing/2014/main" id="{17D49726-8235-4FD4-BD2C-FF815091C123}"/>
+              </a:ext>
+            </a:extLst>
+          </p:cNvPr>
+          <p:cNvPicPr>
+            <a:picLocks noChangeAspect="1" noChangeArrowheads="1"/>
+          </p:cNvPicPr>
+          <p:nvPr/>
+        </p:nvPicPr>
+        <p:blipFill>
+          <a:blip r:embed="rId4">
+            <a:extLst>
+              <a:ext uri="{28A0092B-C50C-407E-A947-70E740481C1C}">
+                <a14:useLocalDpi xmlns:a14="http://schemas.microsoft.com/office/drawing/2010/main" val="0"/>
+              </a:ext>
+            </a:extLst>
+          </a:blip>
+          <a:srcRect/>
+          <a:stretch>
+            <a:fillRect/>
+          </a:stretch>
+        </p:blipFill>
+        <p:spPr bwMode="auto">
+          <a:xfrm>
+            <a:off x="805343" y="3733315"/>
+            <a:ext cx="1795244" cy="944997"/>
+          </a:xfrm>
+          <a:prstGeom prst="rect">
+            <a:avLst/>
+          </a:prstGeom>
+          <a:noFill/>
+          <a:extLst>
+            <a:ext uri="{909E8E84-426E-40DD-AFC4-6F175D3DCCD1}">
+              <a14:hiddenFill xmlns:a14="http://schemas.microsoft.com/office/drawing/2010/main">
+                <a:solidFill>
+                  <a:srgbClr val="FFFFFF"/>
+                </a:solidFill>
+              </a14:hiddenFill>
+            </a:ext>
+          </a:extLst>
+        </p:spPr>
+      </p:pic>
+      <p:sp>
+        <p:nvSpPr>
+          <p:cNvPr id="4" name="Rectangle 3">
+            <a:extLst>
+              <a:ext uri="{FF2B5EF4-FFF2-40B4-BE49-F238E27FC236}">
+                <a16:creationId xmlns:a16="http://schemas.microsoft.com/office/drawing/2014/main" id="{AC8B353C-2707-448F-87A3-0DE9964C463A}"/>
+              </a:ext>
+            </a:extLst>
+          </p:cNvPr>
+          <p:cNvSpPr/>
+          <p:nvPr/>
+        </p:nvSpPr>
+        <p:spPr>
+          <a:xfrm>
+            <a:off x="3190551" y="2859432"/>
+            <a:ext cx="2149948" cy="369332"/>
+          </a:xfrm>
+          <a:prstGeom prst="rect">
+            <a:avLst/>
+          </a:prstGeom>
+        </p:spPr>
+        <p:txBody>
+          <a:bodyPr wrap="none">
+            <a:spAutoFit/>
+          </a:bodyPr>
+          <a:lstStyle/>
+          <a:p>
+            <a:r>
+              <a:rPr lang="en-GB" dirty="0" err="1"/>
+              <a:t>oxygenModel.Rmd</a:t>
+            </a:r>
+            <a:endParaRPr lang="en-GB" dirty="0"/>
+          </a:p>
+        </p:txBody>
+      </p:sp>
+      <p:pic>
+        <p:nvPicPr>
+          <p:cNvPr id="2058" name="Picture 10" descr="Free File SVG, PNG Icon, Symbol. Download Image.">
+            <a:extLst>
+              <a:ext uri="{FF2B5EF4-FFF2-40B4-BE49-F238E27FC236}">
+                <a16:creationId xmlns:a16="http://schemas.microsoft.com/office/drawing/2014/main" id="{107FC75D-D723-43A3-B7B4-CF76FC541D3F}"/>
+              </a:ext>
+            </a:extLst>
+          </p:cNvPr>
+          <p:cNvPicPr>
+            <a:picLocks noChangeAspect="1" noChangeArrowheads="1"/>
+          </p:cNvPicPr>
+          <p:nvPr/>
+        </p:nvPicPr>
+        <p:blipFill>
+          <a:blip r:embed="rId5">
+            <a:extLst>
+              <a:ext uri="{28A0092B-C50C-407E-A947-70E740481C1C}">
+                <a14:useLocalDpi xmlns:a14="http://schemas.microsoft.com/office/drawing/2010/main" val="0"/>
+              </a:ext>
+            </a:extLst>
+          </a:blip>
+          <a:srcRect/>
+          <a:stretch>
+            <a:fillRect/>
+          </a:stretch>
+        </p:blipFill>
+        <p:spPr bwMode="auto">
+          <a:xfrm>
+            <a:off x="2579306" y="2545939"/>
+            <a:ext cx="675621" cy="675621"/>
+          </a:xfrm>
+          <a:prstGeom prst="rect">
+            <a:avLst/>
+          </a:prstGeom>
+          <a:noFill/>
+          <a:extLst>
+            <a:ext uri="{909E8E84-426E-40DD-AFC4-6F175D3DCCD1}">
+              <a14:hiddenFill xmlns:a14="http://schemas.microsoft.com/office/drawing/2010/main">
+                <a:solidFill>
+                  <a:srgbClr val="FFFFFF"/>
+                </a:solidFill>
+              </a14:hiddenFill>
+            </a:ext>
+          </a:extLst>
+        </p:spPr>
+      </p:pic>
+      <p:sp>
+        <p:nvSpPr>
+          <p:cNvPr id="5" name="Rectangle: Rounded Corners 4">
+            <a:extLst>
+              <a:ext uri="{FF2B5EF4-FFF2-40B4-BE49-F238E27FC236}">
+                <a16:creationId xmlns:a16="http://schemas.microsoft.com/office/drawing/2014/main" id="{8517FC58-24FF-4B35-A526-CFAF0CC67C69}"/>
+              </a:ext>
+            </a:extLst>
+          </p:cNvPr>
+          <p:cNvSpPr/>
+          <p:nvPr/>
+        </p:nvSpPr>
+        <p:spPr>
+          <a:xfrm>
+            <a:off x="830510" y="1979802"/>
+            <a:ext cx="6006518" cy="1560352"/>
+          </a:xfrm>
+          <a:prstGeom prst="roundRect">
+            <a:avLst/>
+          </a:prstGeom>
+          <a:noFill/>
+        </p:spPr>
+        <p:style>
+          <a:lnRef idx="2">
+            <a:schemeClr val="accent1">
+              <a:shade val="50000"/>
+            </a:schemeClr>
+          </a:lnRef>
+          <a:fillRef idx="1">
+            <a:schemeClr val="accent1"/>
+          </a:fillRef>
+          <a:effectRef idx="0">
+            <a:schemeClr val="accent1"/>
+          </a:effectRef>
+          <a:fontRef idx="minor">
+            <a:schemeClr val="lt1"/>
+          </a:fontRef>
+        </p:style>
+        <p:txBody>
+          <a:bodyPr rtlCol="0" anchor="ctr"/>
+          <a:lstStyle/>
+          <a:p>
+            <a:pPr algn="ctr"/>
+            <a:endParaRPr lang="en-GB"/>
+          </a:p>
+        </p:txBody>
+      </p:sp>
+      <p:sp>
+        <p:nvSpPr>
+          <p:cNvPr id="11" name="TextBox 10">
+            <a:extLst>
+              <a:ext uri="{FF2B5EF4-FFF2-40B4-BE49-F238E27FC236}">
+                <a16:creationId xmlns:a16="http://schemas.microsoft.com/office/drawing/2014/main" id="{27054084-3635-4BAC-8E1E-2F755F43C87B}"/>
+              </a:ext>
+            </a:extLst>
+          </p:cNvPr>
+          <p:cNvSpPr txBox="1"/>
+          <p:nvPr/>
+        </p:nvSpPr>
+        <p:spPr>
+          <a:xfrm>
+            <a:off x="1702965" y="2042859"/>
+            <a:ext cx="5125121" cy="307777"/>
+          </a:xfrm>
+          <a:prstGeom prst="rect">
+            <a:avLst/>
+          </a:prstGeom>
+          <a:noFill/>
+        </p:spPr>
+        <p:txBody>
+          <a:bodyPr wrap="none" rtlCol="0">
+            <a:spAutoFit/>
+          </a:bodyPr>
+          <a:lstStyle/>
+          <a:p>
+            <a:r>
+              <a:rPr lang="en-GB" sz="1400" dirty="0">
+                <a:hlinkClick r:id="rId6"/>
+              </a:rPr>
+              <a:t>https://github.com/camilleminaudo/oxygen-model-students</a:t>
+            </a:r>
+            <a:r>
+              <a:rPr lang="en-GB" sz="1400" dirty="0"/>
+              <a:t>  </a:t>
+            </a:r>
+          </a:p>
+        </p:txBody>
+      </p:sp>
+      <p:sp>
+        <p:nvSpPr>
+          <p:cNvPr id="12" name="Rectangle: Rounded Corners 11">
+            <a:extLst>
+              <a:ext uri="{FF2B5EF4-FFF2-40B4-BE49-F238E27FC236}">
+                <a16:creationId xmlns:a16="http://schemas.microsoft.com/office/drawing/2014/main" id="{9440C614-0474-44DB-94ED-FB1C4A19A964}"/>
+              </a:ext>
+            </a:extLst>
+          </p:cNvPr>
+          <p:cNvSpPr/>
+          <p:nvPr/>
+        </p:nvSpPr>
+        <p:spPr>
+          <a:xfrm>
+            <a:off x="830510" y="3898136"/>
+            <a:ext cx="2206305" cy="683721"/>
+          </a:xfrm>
+          <a:prstGeom prst="roundRect">
+            <a:avLst/>
+          </a:prstGeom>
+          <a:noFill/>
+        </p:spPr>
+        <p:style>
+          <a:lnRef idx="2">
+            <a:schemeClr val="accent1">
+              <a:shade val="50000"/>
+            </a:schemeClr>
+          </a:lnRef>
+          <a:fillRef idx="1">
+            <a:schemeClr val="accent1"/>
+          </a:fillRef>
+          <a:effectRef idx="0">
+            <a:schemeClr val="accent1"/>
+          </a:effectRef>
+          <a:fontRef idx="minor">
+            <a:schemeClr val="lt1"/>
+          </a:fontRef>
+        </p:style>
+        <p:txBody>
+          <a:bodyPr rtlCol="0" anchor="ctr"/>
+          <a:lstStyle/>
+          <a:p>
+            <a:pPr algn="ctr"/>
+            <a:endParaRPr lang="en-GB"/>
+          </a:p>
+        </p:txBody>
+      </p:sp>
+      <p:cxnSp>
+        <p:nvCxnSpPr>
+          <p:cNvPr id="7" name="Connector: Elbow 6">
+            <a:extLst>
+              <a:ext uri="{FF2B5EF4-FFF2-40B4-BE49-F238E27FC236}">
+                <a16:creationId xmlns:a16="http://schemas.microsoft.com/office/drawing/2014/main" id="{608FCC5C-2C64-4379-8192-5920852B4ABF}"/>
+              </a:ext>
+            </a:extLst>
+          </p:cNvPr>
+          <p:cNvCxnSpPr>
+            <a:stCxn id="4" idx="2"/>
+            <a:endCxn id="2054" idx="1"/>
+          </p:cNvCxnSpPr>
+          <p:nvPr/>
+        </p:nvCxnSpPr>
+        <p:spPr>
+          <a:xfrm rot="16200000" flipH="1">
+            <a:off x="3694660" y="3799629"/>
+            <a:ext cx="1652444" cy="510714"/>
+          </a:xfrm>
+          <a:prstGeom prst="bentConnector2">
+            <a:avLst/>
+          </a:prstGeom>
+          <a:ln w="57150">
+            <a:tailEnd type="triangle"/>
+          </a:ln>
+        </p:spPr>
+        <p:style>
+          <a:lnRef idx="1">
+            <a:schemeClr val="accent1"/>
+          </a:lnRef>
+          <a:fillRef idx="0">
+            <a:schemeClr val="accent1"/>
+          </a:fillRef>
+          <a:effectRef idx="0">
+            <a:schemeClr val="accent1"/>
+          </a:effectRef>
+          <a:fontRef idx="minor">
+            <a:schemeClr val="tx1"/>
+          </a:fontRef>
+        </p:style>
+      </p:cxnSp>
+      <p:cxnSp>
+        <p:nvCxnSpPr>
+          <p:cNvPr id="15" name="Connector: Elbow 14">
+            <a:extLst>
+              <a:ext uri="{FF2B5EF4-FFF2-40B4-BE49-F238E27FC236}">
+                <a16:creationId xmlns:a16="http://schemas.microsoft.com/office/drawing/2014/main" id="{4C5A78B4-43E3-4725-B22B-57F51580254F}"/>
+              </a:ext>
+            </a:extLst>
+          </p:cNvPr>
+          <p:cNvCxnSpPr>
+            <a:cxnSpLocks/>
+            <a:stCxn id="12" idx="3"/>
+            <a:endCxn id="2054" idx="1"/>
+          </p:cNvCxnSpPr>
+          <p:nvPr/>
+        </p:nvCxnSpPr>
+        <p:spPr>
+          <a:xfrm>
+            <a:off x="3036815" y="4239997"/>
+            <a:ext cx="1739424" cy="641211"/>
+          </a:xfrm>
+          <a:prstGeom prst="bentConnector3">
+            <a:avLst>
+              <a:gd name="adj1" fmla="val 50000"/>
+            </a:avLst>
+          </a:prstGeom>
+          <a:ln w="57150">
+            <a:tailEnd type="triangle"/>
+          </a:ln>
+        </p:spPr>
+        <p:style>
+          <a:lnRef idx="1">
+            <a:schemeClr val="accent1"/>
+          </a:lnRef>
+          <a:fillRef idx="0">
+            <a:schemeClr val="accent1"/>
+          </a:fillRef>
+          <a:effectRef idx="0">
+            <a:schemeClr val="accent1"/>
+          </a:effectRef>
+          <a:fontRef idx="minor">
+            <a:schemeClr val="tx1"/>
+          </a:fontRef>
+        </p:style>
+      </p:cxnSp>
+    </p:spTree>
+    <p:extLst>
+      <p:ext uri="{BB962C8B-B14F-4D97-AF65-F5344CB8AC3E}">
+        <p14:creationId xmlns:p14="http://schemas.microsoft.com/office/powerpoint/2010/main" val="1884481541"/>
+      </p:ext>
+    </p:extLst>
+  </p:cSld>
+  <p:clrMapOvr>
+    <a:masterClrMapping/>
+  </p:clrMapOvr>
+</p:sld>
+</file>
+
+<file path=ppt/slides/slide26.xml><?xml version="1.0" encoding="utf-8"?>
+<p:sld xmlns:a="http://schemas.openxmlformats.org/drawingml/2006/main" xmlns:r="http://schemas.openxmlformats.org/officeDocument/2006/relationships" xmlns:p="http://schemas.openxmlformats.org/presentationml/2006/main">
+  <p:cSld>
+    <p:spTree>
+      <p:nvGrpSpPr>
+        <p:cNvPr id="1" name=""/>
+        <p:cNvGrpSpPr/>
+        <p:nvPr/>
+      </p:nvGrpSpPr>
+      <p:grpSpPr>
+        <a:xfrm>
+          <a:off x="0" y="0"/>
+          <a:ext cx="0" cy="0"/>
+          <a:chOff x="0" y="0"/>
+          <a:chExt cx="0" cy="0"/>
+        </a:xfrm>
+      </p:grpSpPr>
+      <p:sp>
+        <p:nvSpPr>
+          <p:cNvPr id="4" name="Title 3">
+            <a:extLst>
+              <a:ext uri="{FF2B5EF4-FFF2-40B4-BE49-F238E27FC236}">
+                <a16:creationId xmlns:a16="http://schemas.microsoft.com/office/drawing/2014/main" id="{E09A3DE4-0156-4DE6-8257-989E5FD5576B}"/>
+              </a:ext>
+            </a:extLst>
+          </p:cNvPr>
+          <p:cNvSpPr>
+            <a:spLocks noGrp="1"/>
+          </p:cNvSpPr>
+          <p:nvPr>
+            <p:ph type="title"/>
+          </p:nvPr>
+        </p:nvSpPr>
+        <p:spPr/>
+        <p:txBody>
+          <a:bodyPr/>
+          <a:lstStyle/>
+          <a:p>
+            <a:r>
+              <a:rPr lang="en-GB" dirty="0"/>
+              <a:t>Step by step</a:t>
+            </a:r>
+          </a:p>
+        </p:txBody>
+      </p:sp>
+      <p:sp>
+        <p:nvSpPr>
+          <p:cNvPr id="5" name="Content Placeholder 4">
+            <a:extLst>
+              <a:ext uri="{FF2B5EF4-FFF2-40B4-BE49-F238E27FC236}">
+                <a16:creationId xmlns:a16="http://schemas.microsoft.com/office/drawing/2014/main" id="{048B04A0-3372-4C1A-B3D8-50D71A9C7ABC}"/>
+              </a:ext>
+            </a:extLst>
+          </p:cNvPr>
+          <p:cNvSpPr>
+            <a:spLocks noGrp="1"/>
+          </p:cNvSpPr>
+          <p:nvPr>
+            <p:ph idx="1"/>
+          </p:nvPr>
+        </p:nvSpPr>
+        <p:spPr>
+          <a:xfrm>
+            <a:off x="946404" y="1828801"/>
+            <a:ext cx="4780529" cy="4351337"/>
+          </a:xfrm>
+        </p:spPr>
+        <p:txBody>
+          <a:bodyPr/>
+          <a:lstStyle/>
+          <a:p>
+            <a:r>
+              <a:rPr lang="en-GB" dirty="0"/>
+              <a:t>Create a GitHub account</a:t>
+            </a:r>
+          </a:p>
+          <a:p>
+            <a:r>
+              <a:rPr lang="en-GB" dirty="0"/>
+              <a:t>Go to </a:t>
+            </a:r>
+            <a:r>
+              <a:rPr lang="en-GB" dirty="0">
+                <a:hlinkClick r:id="rId2"/>
+              </a:rPr>
+              <a:t>https://github.com/camilleminaudo/oxygen-model-students</a:t>
+            </a:r>
+            <a:r>
+              <a:rPr lang="en-GB" dirty="0"/>
+              <a:t>  </a:t>
+            </a:r>
+          </a:p>
+          <a:p>
+            <a:r>
+              <a:rPr lang="en-GB" dirty="0"/>
+              <a:t>Click on “</a:t>
+            </a:r>
+            <a:r>
+              <a:rPr lang="en-GB" dirty="0" err="1"/>
+              <a:t>lauch</a:t>
+            </a:r>
+            <a:r>
+              <a:rPr lang="en-GB" dirty="0"/>
+              <a:t> binder” in the README.md file</a:t>
+            </a:r>
+          </a:p>
+          <a:p>
+            <a:r>
+              <a:rPr lang="en-GB" dirty="0"/>
+              <a:t>Wait for installation and </a:t>
+            </a:r>
+            <a:r>
+              <a:rPr lang="en-GB" dirty="0" err="1"/>
+              <a:t>Jupyter</a:t>
+            </a:r>
+            <a:r>
+              <a:rPr lang="en-GB" dirty="0"/>
+              <a:t> install</a:t>
+            </a:r>
+          </a:p>
+          <a:p>
+            <a:r>
+              <a:rPr lang="en-GB" dirty="0"/>
+              <a:t>Open a </a:t>
+            </a:r>
+            <a:r>
+              <a:rPr lang="en-GB" dirty="0" err="1"/>
+              <a:t>Rstudio</a:t>
+            </a:r>
+            <a:r>
+              <a:rPr lang="en-GB" dirty="0"/>
+              <a:t> notebook</a:t>
+            </a:r>
+          </a:p>
+          <a:p>
+            <a:r>
+              <a:rPr lang="en-GB" dirty="0"/>
+              <a:t>Open the file </a:t>
+            </a:r>
+            <a:r>
+              <a:rPr lang="en-GB" dirty="0" err="1"/>
+              <a:t>oxygenModel.Rmd</a:t>
+            </a:r>
+            <a:endParaRPr lang="en-GB" dirty="0"/>
+          </a:p>
+        </p:txBody>
+      </p:sp>
+      <p:pic>
+        <p:nvPicPr>
+          <p:cNvPr id="8" name="Picture 7">
+            <a:extLst>
+              <a:ext uri="{FF2B5EF4-FFF2-40B4-BE49-F238E27FC236}">
+                <a16:creationId xmlns:a16="http://schemas.microsoft.com/office/drawing/2014/main" id="{2FD84676-0C18-4016-8707-3A1B7E2D29C9}"/>
+              </a:ext>
+            </a:extLst>
+          </p:cNvPr>
+          <p:cNvPicPr>
+            <a:picLocks noChangeAspect="1"/>
+          </p:cNvPicPr>
+          <p:nvPr/>
+        </p:nvPicPr>
+        <p:blipFill>
+          <a:blip r:embed="rId3"/>
+          <a:stretch>
+            <a:fillRect/>
+          </a:stretch>
+        </p:blipFill>
+        <p:spPr>
+          <a:xfrm>
+            <a:off x="5726933" y="1275804"/>
+            <a:ext cx="3318642" cy="2965094"/>
+          </a:xfrm>
+          <a:prstGeom prst="rect">
+            <a:avLst/>
+          </a:prstGeom>
+        </p:spPr>
+      </p:pic>
+      <p:sp>
+        <p:nvSpPr>
+          <p:cNvPr id="9" name="Oval 8">
+            <a:extLst>
+              <a:ext uri="{FF2B5EF4-FFF2-40B4-BE49-F238E27FC236}">
+                <a16:creationId xmlns:a16="http://schemas.microsoft.com/office/drawing/2014/main" id="{957D631F-200D-45C0-8A8E-1DB29731F750}"/>
+              </a:ext>
+            </a:extLst>
+          </p:cNvPr>
+          <p:cNvSpPr/>
+          <p:nvPr/>
+        </p:nvSpPr>
+        <p:spPr>
+          <a:xfrm>
+            <a:off x="5754848" y="3791824"/>
+            <a:ext cx="1040234" cy="385893"/>
+          </a:xfrm>
+          <a:prstGeom prst="ellipse">
+            <a:avLst/>
+          </a:prstGeom>
+          <a:noFill/>
+          <a:ln>
+            <a:solidFill>
+              <a:srgbClr val="FF0000"/>
+            </a:solidFill>
+          </a:ln>
+        </p:spPr>
+        <p:style>
+          <a:lnRef idx="2">
+            <a:schemeClr val="accent1">
+              <a:shade val="50000"/>
+            </a:schemeClr>
+          </a:lnRef>
+          <a:fillRef idx="1">
+            <a:schemeClr val="accent1"/>
+          </a:fillRef>
+          <a:effectRef idx="0">
+            <a:schemeClr val="accent1"/>
+          </a:effectRef>
+          <a:fontRef idx="minor">
+            <a:schemeClr val="lt1"/>
+          </a:fontRef>
+        </p:style>
+        <p:txBody>
+          <a:bodyPr rtlCol="0" anchor="ctr"/>
+          <a:lstStyle/>
+          <a:p>
+            <a:pPr algn="ctr"/>
+            <a:endParaRPr lang="en-GB"/>
+          </a:p>
+        </p:txBody>
+      </p:sp>
+    </p:spTree>
+    <p:extLst>
+      <p:ext uri="{BB962C8B-B14F-4D97-AF65-F5344CB8AC3E}">
+        <p14:creationId xmlns:p14="http://schemas.microsoft.com/office/powerpoint/2010/main" val="2866998275"/>
       </p:ext>
     </p:extLst>
   </p:cSld>

</xml_diff>